<commit_message>
GERYON: Added some comments and updated powerpoint for textures
</commit_message>
<xml_diff>
--- a/geryon.pptx
+++ b/geryon.pptx
@@ -68,8 +68,12 @@
     <p:sldId id="315" r:id="rId62"/>
     <p:sldId id="316" r:id="rId63"/>
     <p:sldId id="318" r:id="rId64"/>
-    <p:sldId id="296" r:id="rId65"/>
-    <p:sldId id="297" r:id="rId66"/>
+    <p:sldId id="323" r:id="rId65"/>
+    <p:sldId id="324" r:id="rId66"/>
+    <p:sldId id="325" r:id="rId67"/>
+    <p:sldId id="326" r:id="rId68"/>
+    <p:sldId id="296" r:id="rId69"/>
+    <p:sldId id="297" r:id="rId70"/>
   </p:sldIdLst>
   <p:sldSz cx="9144000" cy="6858000" type="screen4x3"/>
   <p:notesSz cx="6858000" cy="9144000"/>
@@ -366,7 +370,7 @@
             <a:fld id="{9F85648D-267C-4F54-90B5-C36298A60516}" type="datetimeFigureOut">
               <a:rPr lang="en-US" smtClean="0"/>
               <a:pPr/>
-              <a:t>5/5/10</a:t>
+              <a:t>8/20/10</a:t>
             </a:fld>
             <a:endParaRPr lang="en-US"/>
           </a:p>
@@ -721,7 +725,7 @@
             <a:fld id="{B99FC8A4-244F-0044-8098-5FFBFA181F2A}" type="datetimeFigureOut">
               <a:rPr lang="en-US" smtClean="0"/>
               <a:pPr/>
-              <a:t>5/5/10</a:t>
+              <a:t>8/20/10</a:t>
             </a:fld>
             <a:endParaRPr lang="en-US"/>
           </a:p>
@@ -898,7 +902,7 @@
             <a:fld id="{B99FC8A4-244F-0044-8098-5FFBFA181F2A}" type="datetimeFigureOut">
               <a:rPr lang="en-US" smtClean="0"/>
               <a:pPr/>
-              <a:t>5/5/10</a:t>
+              <a:t>8/20/10</a:t>
             </a:fld>
             <a:endParaRPr lang="en-US"/>
           </a:p>
@@ -1013,7 +1017,7 @@
             <a:fld id="{B99FC8A4-244F-0044-8098-5FFBFA181F2A}" type="datetimeFigureOut">
               <a:rPr lang="en-US" smtClean="0"/>
               <a:pPr/>
-              <a:t>5/5/10</a:t>
+              <a:t>8/20/10</a:t>
             </a:fld>
             <a:endParaRPr lang="en-US"/>
           </a:p>
@@ -1373,7 +1377,7 @@
             <a:fld id="{74CBEAF9-9E58-4CC8-A6FF-6DD8A58DEEA4}" type="datetimeFigureOut">
               <a:rPr lang="en-US" smtClean="0"/>
               <a:pPr/>
-              <a:t>5/5/10</a:t>
+              <a:t>8/20/10</a:t>
             </a:fld>
             <a:endParaRPr lang="en-US"/>
           </a:p>
@@ -1640,7 +1644,7 @@
             <a:fld id="{B99FC8A4-244F-0044-8098-5FFBFA181F2A}" type="datetimeFigureOut">
               <a:rPr lang="en-US" smtClean="0"/>
               <a:pPr/>
-              <a:t>5/5/10</a:t>
+              <a:t>8/20/10</a:t>
             </a:fld>
             <a:endParaRPr lang="en-US"/>
           </a:p>
@@ -2004,7 +2008,7 @@
             <a:fld id="{B99FC8A4-244F-0044-8098-5FFBFA181F2A}" type="datetimeFigureOut">
               <a:rPr lang="en-US" smtClean="0"/>
               <a:pPr/>
-              <a:t>5/5/10</a:t>
+              <a:t>8/20/10</a:t>
             </a:fld>
             <a:endParaRPr lang="en-US"/>
           </a:p>
@@ -2233,7 +2237,7 @@
             <a:fld id="{B99FC8A4-244F-0044-8098-5FFBFA181F2A}" type="datetimeFigureOut">
               <a:rPr lang="en-US" smtClean="0"/>
               <a:pPr/>
-              <a:t>5/5/10</a:t>
+              <a:t>8/20/10</a:t>
             </a:fld>
             <a:endParaRPr lang="en-US"/>
           </a:p>
@@ -2325,7 +2329,7 @@
             <a:fld id="{B99FC8A4-244F-0044-8098-5FFBFA181F2A}" type="datetimeFigureOut">
               <a:rPr lang="en-US" smtClean="0"/>
               <a:pPr/>
-              <a:t>5/5/10</a:t>
+              <a:t>8/20/10</a:t>
             </a:fld>
             <a:endParaRPr lang="en-US"/>
           </a:p>
@@ -2594,7 +2598,7 @@
             <a:fld id="{B99FC8A4-244F-0044-8098-5FFBFA181F2A}" type="datetimeFigureOut">
               <a:rPr lang="en-US" smtClean="0"/>
               <a:pPr/>
-              <a:t>5/5/10</a:t>
+              <a:t>8/20/10</a:t>
             </a:fld>
             <a:endParaRPr lang="en-US"/>
           </a:p>
@@ -2824,7 +2828,7 @@
             <a:fld id="{B99FC8A4-244F-0044-8098-5FFBFA181F2A}" type="datetimeFigureOut">
               <a:rPr lang="en-US" smtClean="0"/>
               <a:pPr/>
-              <a:t>5/5/10</a:t>
+              <a:t>8/20/10</a:t>
             </a:fld>
             <a:endParaRPr lang="en-US"/>
           </a:p>
@@ -3325,7 +3329,7 @@
             <a:fld id="{B99FC8A4-244F-0044-8098-5FFBFA181F2A}" type="datetimeFigureOut">
               <a:rPr lang="en-US" smtClean="0"/>
               <a:pPr/>
-              <a:t>5/5/10</a:t>
+              <a:t>8/20/10</a:t>
             </a:fld>
             <a:endParaRPr lang="en-US"/>
           </a:p>
@@ -3798,39 +3802,6 @@
         </p:nvSpPr>
         <p:spPr/>
       </p:sp>
-      <p:pic>
-        <p:nvPicPr>
-          <p:cNvPr id="5" name="Picture 5"/>
-          <p:cNvPicPr>
-            <a:picLocks noChangeArrowheads="1"/>
-          </p:cNvPicPr>
-          <p:nvPr/>
-        </p:nvPicPr>
-        <p:blipFill>
-          <a:blip r:embed="rId2"/>
-          <a:srcRect/>
-          <a:stretch>
-            <a:fillRect/>
-          </a:stretch>
-        </p:blipFill>
-        <p:spPr bwMode="auto">
-          <a:xfrm>
-            <a:off x="7813035" y="305380"/>
-            <a:ext cx="1104900" cy="431800"/>
-          </a:xfrm>
-          <a:prstGeom prst="rect">
-            <a:avLst/>
-          </a:prstGeom>
-          <a:noFill/>
-          <a:ln w="12700">
-            <a:noFill/>
-            <a:miter lim="800000"/>
-            <a:headEnd/>
-            <a:tailEnd/>
-          </a:ln>
-          <a:effectLst/>
-        </p:spPr>
-      </p:pic>
       <p:sp>
         <p:nvSpPr>
           <p:cNvPr id="6" name="TextBox 5"/>
@@ -3858,14 +3829,15 @@
               <a:rPr lang="en-US" sz="1200" dirty="0" smtClean="0"/>
               <a:t>W. Michael Brown</a:t>
             </a:r>
+            <a:endParaRPr lang="en-US" sz="1200" dirty="0" smtClean="0"/>
           </a:p>
           <a:p>
             <a:pPr algn="r"/>
             <a:r>
               <a:rPr lang="en-US" sz="1200" i="1" dirty="0" smtClean="0">
-                <a:hlinkClick r:id="rId3"/>
-              </a:rPr>
-              <a:t>wmbrown@sandia.gov</a:t>
+                <a:hlinkClick r:id="rId2"/>
+              </a:rPr>
+              <a:t>brownw@ornl.gov</a:t>
             </a:r>
             <a:endParaRPr lang="en-US" sz="1200" i="1" dirty="0" smtClean="0"/>
           </a:p>
@@ -3878,12 +3850,36 @@
             <a:fld id="{B78C6173-A124-044B-A6DC-2740D4C46ECF}" type="datetime1">
               <a:rPr lang="en-US" sz="1200" i="0" smtClean="0"/>
               <a:pPr algn="r"/>
-              <a:t>5/5/10</a:t>
+              <a:t>8/20/10</a:t>
             </a:fld>
             <a:endParaRPr lang="en-US" sz="1200" dirty="0"/>
           </a:p>
         </p:txBody>
       </p:sp>
+      <p:pic>
+        <p:nvPicPr>
+          <p:cNvPr id="13" name="Picture 12" descr="WordMarkLeaf.png"/>
+          <p:cNvPicPr>
+            <a:picLocks noChangeAspect="1"/>
+          </p:cNvPicPr>
+          <p:nvPr/>
+        </p:nvPicPr>
+        <p:blipFill>
+          <a:blip r:embed="rId3"/>
+          <a:stretch>
+            <a:fillRect/>
+          </a:stretch>
+        </p:blipFill>
+        <p:spPr>
+          <a:xfrm>
+            <a:off x="5387494" y="141712"/>
+            <a:ext cx="3530441" cy="595468"/>
+          </a:xfrm>
+          <a:prstGeom prst="rect">
+            <a:avLst/>
+          </a:prstGeom>
+        </p:spPr>
+      </p:pic>
     </p:spTree>
   </p:cSld>
   <p:clrMapOvr>
@@ -17856,15 +17852,7 @@
           <a:p>
             <a:r>
               <a:rPr lang="en-US" dirty="0" smtClean="0"/>
-              <a:t>There is no type</a:t>
-            </a:r>
-            <a:r>
-              <a:rPr lang="en-US" dirty="0" smtClean="0"/>
-              <a:t> casting </a:t>
-            </a:r>
-            <a:r>
-              <a:rPr lang="en-US" dirty="0" smtClean="0"/>
-              <a:t>between arguments passed with </a:t>
+              <a:t>There is no type casting between arguments passed with </a:t>
             </a:r>
             <a:r>
               <a:rPr lang="en-US" dirty="0" err="1" smtClean="0"/>
@@ -21183,6 +21171,1256 @@
       </p:grpSpPr>
       <p:sp>
         <p:nvSpPr>
+          <p:cNvPr id="2" name="Subtitle 1"/>
+          <p:cNvSpPr>
+            <a:spLocks noGrp="1"/>
+          </p:cNvSpPr>
+          <p:nvPr>
+            <p:ph type="subTitle" idx="1"/>
+          </p:nvPr>
+        </p:nvSpPr>
+        <p:spPr/>
+        <p:txBody>
+          <a:bodyPr/>
+          <a:lstStyle/>
+          <a:p>
+            <a:r>
+              <a:rPr lang="en-US" dirty="0" smtClean="0"/>
+              <a:t>1D Texture Binding</a:t>
+            </a:r>
+            <a:endParaRPr lang="en-US" dirty="0"/>
+          </a:p>
+        </p:txBody>
+      </p:sp>
+      <p:sp>
+        <p:nvSpPr>
+          <p:cNvPr id="3" name="Title 2"/>
+          <p:cNvSpPr>
+            <a:spLocks noGrp="1"/>
+          </p:cNvSpPr>
+          <p:nvPr>
+            <p:ph type="ctrTitle"/>
+          </p:nvPr>
+        </p:nvSpPr>
+        <p:spPr/>
+        <p:txBody>
+          <a:bodyPr/>
+          <a:lstStyle/>
+          <a:p>
+            <a:r>
+              <a:rPr lang="en-US" dirty="0" err="1" smtClean="0"/>
+              <a:t>Geryon</a:t>
+            </a:r>
+            <a:endParaRPr lang="en-US" dirty="0"/>
+          </a:p>
+        </p:txBody>
+      </p:sp>
+    </p:spTree>
+  </p:cSld>
+  <p:clrMapOvr>
+    <a:masterClrMapping/>
+  </p:clrMapOvr>
+</p:sld>
+</file>
+
+<file path=ppt/slides/slide65.xml><?xml version="1.0" encoding="utf-8"?>
+<p:sld xmlns:a="http://schemas.openxmlformats.org/drawingml/2006/main" xmlns:r="http://schemas.openxmlformats.org/officeDocument/2006/relationships" xmlns:mc="http://schemas.openxmlformats.org/markup-compatibility/2006" xmlns:mv="urn:schemas-microsoft-com:mac:vml" xmlns:p="http://schemas.openxmlformats.org/presentationml/2006/main" mc:Ignorable="mv" mc:PreserveAttributes="mv:*">
+  <p:cSld>
+    <p:spTree>
+      <p:nvGrpSpPr>
+        <p:cNvPr id="1" name=""/>
+        <p:cNvGrpSpPr/>
+        <p:nvPr/>
+      </p:nvGrpSpPr>
+      <p:grpSpPr>
+        <a:xfrm>
+          <a:off x="0" y="0"/>
+          <a:ext cx="0" cy="0"/>
+          <a:chOff x="0" y="0"/>
+          <a:chExt cx="0" cy="0"/>
+        </a:xfrm>
+      </p:grpSpPr>
+      <p:sp>
+        <p:nvSpPr>
+          <p:cNvPr id="2" name="Title 1"/>
+          <p:cNvSpPr>
+            <a:spLocks noGrp="1"/>
+          </p:cNvSpPr>
+          <p:nvPr>
+            <p:ph type="title"/>
+          </p:nvPr>
+        </p:nvSpPr>
+        <p:spPr/>
+        <p:txBody>
+          <a:bodyPr/>
+          <a:lstStyle/>
+          <a:p>
+            <a:r>
+              <a:rPr lang="en-US" dirty="0" smtClean="0"/>
+              <a:t>1D Texture Binding</a:t>
+            </a:r>
+            <a:endParaRPr lang="en-US" dirty="0"/>
+          </a:p>
+        </p:txBody>
+      </p:sp>
+      <p:sp>
+        <p:nvSpPr>
+          <p:cNvPr id="3" name="Content Placeholder 2"/>
+          <p:cNvSpPr>
+            <a:spLocks noGrp="1"/>
+          </p:cNvSpPr>
+          <p:nvPr>
+            <p:ph sz="quarter" idx="1"/>
+          </p:nvPr>
+        </p:nvSpPr>
+        <p:spPr/>
+        <p:txBody>
+          <a:bodyPr/>
+          <a:lstStyle/>
+          <a:p>
+            <a:r>
+              <a:rPr lang="en-US" dirty="0" smtClean="0"/>
+              <a:t>In CUDA, can bind existing memory allocations to textures for constant access that can be cached</a:t>
+            </a:r>
+          </a:p>
+          <a:p>
+            <a:pPr lvl="1"/>
+            <a:r>
+              <a:rPr lang="en-US" dirty="0" smtClean="0"/>
+              <a:t>In </a:t>
+            </a:r>
+            <a:r>
+              <a:rPr lang="en-US" dirty="0" err="1" smtClean="0"/>
+              <a:t>Geryon</a:t>
+            </a:r>
+            <a:r>
+              <a:rPr lang="en-US" dirty="0" smtClean="0"/>
+              <a:t>, this is accomplished by the </a:t>
+            </a:r>
+            <a:r>
+              <a:rPr lang="en-US" dirty="0" err="1" smtClean="0"/>
+              <a:t>UCL_Texture</a:t>
+            </a:r>
+            <a:r>
+              <a:rPr lang="en-US" dirty="0" smtClean="0"/>
+              <a:t> class</a:t>
+            </a:r>
+          </a:p>
+          <a:p>
+            <a:pPr lvl="1"/>
+            <a:r>
+              <a:rPr lang="en-US" dirty="0" smtClean="0"/>
+              <a:t>This feature is not currently in </a:t>
+            </a:r>
+            <a:r>
+              <a:rPr lang="en-US" dirty="0" err="1" smtClean="0"/>
+              <a:t>OpenCL</a:t>
+            </a:r>
+            <a:r>
+              <a:rPr lang="en-US" dirty="0" smtClean="0"/>
+              <a:t>, so </a:t>
+            </a:r>
+            <a:r>
+              <a:rPr lang="en-US" dirty="0" err="1" smtClean="0"/>
+              <a:t>UCL_Texture</a:t>
+            </a:r>
+            <a:r>
+              <a:rPr lang="en-US" dirty="0" smtClean="0"/>
+              <a:t> routines in the </a:t>
+            </a:r>
+            <a:r>
+              <a:rPr lang="en-US" dirty="0" err="1" smtClean="0"/>
+              <a:t>opencl</a:t>
+            </a:r>
+            <a:r>
+              <a:rPr lang="en-US" dirty="0" smtClean="0"/>
+              <a:t> namespace do nothing.</a:t>
+            </a:r>
+          </a:p>
+          <a:p>
+            <a:pPr lvl="1"/>
+            <a:r>
+              <a:rPr lang="en-US" dirty="0" smtClean="0"/>
+              <a:t>For textures, a vector length is specified; each fetch grabs a vector of the specified length</a:t>
+            </a:r>
+          </a:p>
+          <a:p>
+            <a:endParaRPr lang="en-US" dirty="0" smtClean="0"/>
+          </a:p>
+        </p:txBody>
+      </p:sp>
+    </p:spTree>
+  </p:cSld>
+  <p:clrMapOvr>
+    <a:masterClrMapping/>
+  </p:clrMapOvr>
+</p:sld>
+</file>
+
+<file path=ppt/slides/slide66.xml><?xml version="1.0" encoding="utf-8"?>
+<p:sld xmlns:a="http://schemas.openxmlformats.org/drawingml/2006/main" xmlns:r="http://schemas.openxmlformats.org/officeDocument/2006/relationships" xmlns:mc="http://schemas.openxmlformats.org/markup-compatibility/2006" xmlns:mv="urn:schemas-microsoft-com:mac:vml" xmlns:p="http://schemas.openxmlformats.org/presentationml/2006/main" mc:Ignorable="mv" mc:PreserveAttributes="mv:*">
+  <p:cSld>
+    <p:spTree>
+      <p:nvGrpSpPr>
+        <p:cNvPr id="1" name=""/>
+        <p:cNvGrpSpPr/>
+        <p:nvPr/>
+      </p:nvGrpSpPr>
+      <p:grpSpPr>
+        <a:xfrm>
+          <a:off x="0" y="0"/>
+          <a:ext cx="0" cy="0"/>
+          <a:chOff x="0" y="0"/>
+          <a:chExt cx="0" cy="0"/>
+        </a:xfrm>
+      </p:grpSpPr>
+      <p:sp>
+        <p:nvSpPr>
+          <p:cNvPr id="2" name="Title 1"/>
+          <p:cNvSpPr>
+            <a:spLocks noGrp="1"/>
+          </p:cNvSpPr>
+          <p:nvPr>
+            <p:ph type="title"/>
+          </p:nvPr>
+        </p:nvSpPr>
+        <p:spPr>
+          <a:xfrm>
+            <a:off x="914400" y="277797"/>
+            <a:ext cx="7772400" cy="792605"/>
+          </a:xfrm>
+        </p:spPr>
+        <p:txBody>
+          <a:bodyPr/>
+          <a:lstStyle/>
+          <a:p>
+            <a:r>
+              <a:rPr lang="en-US" dirty="0" smtClean="0"/>
+              <a:t>Assigning a texture reference</a:t>
+            </a:r>
+            <a:endParaRPr lang="en-US" dirty="0"/>
+          </a:p>
+        </p:txBody>
+      </p:sp>
+      <p:sp>
+        <p:nvSpPr>
+          <p:cNvPr id="3" name="Content Placeholder 2"/>
+          <p:cNvSpPr>
+            <a:spLocks noGrp="1"/>
+          </p:cNvSpPr>
+          <p:nvPr>
+            <p:ph sz="quarter" idx="1"/>
+          </p:nvPr>
+        </p:nvSpPr>
+        <p:spPr>
+          <a:xfrm>
+            <a:off x="914400" y="1090644"/>
+            <a:ext cx="7772400" cy="576116"/>
+          </a:xfrm>
+        </p:spPr>
+        <p:txBody>
+          <a:bodyPr/>
+          <a:lstStyle/>
+          <a:p>
+            <a:r>
+              <a:rPr lang="en-US" dirty="0" smtClean="0"/>
+              <a:t>CUDA Driver/</a:t>
+            </a:r>
+            <a:r>
+              <a:rPr lang="en-US" dirty="0" err="1" smtClean="0"/>
+              <a:t>OpenCL</a:t>
+            </a:r>
+            <a:endParaRPr lang="en-US" dirty="0" smtClean="0"/>
+          </a:p>
+        </p:txBody>
+      </p:sp>
+      <p:sp>
+        <p:nvSpPr>
+          <p:cNvPr id="4" name="TextBox 3"/>
+          <p:cNvSpPr txBox="1"/>
+          <p:nvPr/>
+        </p:nvSpPr>
+        <p:spPr>
+          <a:xfrm>
+            <a:off x="914400" y="1656842"/>
+            <a:ext cx="6854217" cy="2031325"/>
+          </a:xfrm>
+          <a:prstGeom prst="rect">
+            <a:avLst/>
+          </a:prstGeom>
+        </p:spPr>
+        <p:style>
+          <a:lnRef idx="2">
+            <a:schemeClr val="accent5"/>
+          </a:lnRef>
+          <a:fillRef idx="1">
+            <a:schemeClr val="lt1"/>
+          </a:fillRef>
+          <a:effectRef idx="0">
+            <a:schemeClr val="accent5"/>
+          </a:effectRef>
+          <a:fontRef idx="minor">
+            <a:schemeClr val="dk1"/>
+          </a:fontRef>
+        </p:style>
+        <p:txBody>
+          <a:bodyPr wrap="square" rtlCol="0">
+            <a:spAutoFit/>
+          </a:bodyPr>
+          <a:lstStyle/>
+          <a:p>
+            <a:r>
+              <a:rPr lang="en-US" dirty="0" smtClean="0">
+                <a:solidFill>
+                  <a:schemeClr val="tx1"/>
+                </a:solidFill>
+                <a:latin typeface="Andale Mono"/>
+                <a:cs typeface="Andale Mono"/>
+              </a:rPr>
+              <a:t>#include “</a:t>
+            </a:r>
+            <a:r>
+              <a:rPr lang="en-US" dirty="0" err="1" smtClean="0">
+                <a:solidFill>
+                  <a:schemeClr val="tx1"/>
+                </a:solidFill>
+                <a:latin typeface="Andale Mono"/>
+                <a:cs typeface="Andale Mono"/>
+              </a:rPr>
+              <a:t>nvd_texture.h</a:t>
+            </a:r>
+            <a:r>
+              <a:rPr lang="en-US" dirty="0" smtClean="0">
+                <a:solidFill>
+                  <a:schemeClr val="tx1"/>
+                </a:solidFill>
+                <a:latin typeface="Andale Mono"/>
+                <a:cs typeface="Andale Mono"/>
+              </a:rPr>
+              <a:t>”</a:t>
+            </a:r>
+          </a:p>
+          <a:p>
+            <a:endParaRPr lang="en-US" i="1" dirty="0" smtClean="0">
+              <a:solidFill>
+                <a:srgbClr val="0000FF"/>
+              </a:solidFill>
+              <a:latin typeface="Andale Mono"/>
+              <a:cs typeface="Andale Mono"/>
+            </a:endParaRPr>
+          </a:p>
+          <a:p>
+            <a:r>
+              <a:rPr lang="en-US" i="1" dirty="0" smtClean="0">
+                <a:solidFill>
+                  <a:srgbClr val="0000FF"/>
+                </a:solidFill>
+                <a:latin typeface="Andale Mono"/>
+                <a:cs typeface="Andale Mono"/>
+              </a:rPr>
+              <a:t>/</a:t>
+            </a:r>
+            <a:r>
+              <a:rPr lang="en-US" i="1" dirty="0" smtClean="0">
+                <a:solidFill>
+                  <a:srgbClr val="0000FF"/>
+                </a:solidFill>
+                <a:latin typeface="Andale Mono"/>
+                <a:cs typeface="Andale Mono"/>
+              </a:rPr>
+              <a:t>/</a:t>
+            </a:r>
+            <a:r>
+              <a:rPr lang="en-US" i="1" dirty="0" smtClean="0">
+                <a:solidFill>
+                  <a:srgbClr val="0000FF"/>
+                </a:solidFill>
+                <a:latin typeface="Andale Mono"/>
+                <a:cs typeface="Andale Mono"/>
+              </a:rPr>
+              <a:t> </a:t>
+            </a:r>
+            <a:r>
+              <a:rPr lang="en-US" i="1" dirty="0" smtClean="0">
+                <a:solidFill>
+                  <a:srgbClr val="0000FF"/>
+                </a:solidFill>
+                <a:latin typeface="Andale Mono"/>
+                <a:cs typeface="Andale Mono"/>
+              </a:rPr>
+              <a:t>T</a:t>
+            </a:r>
+            <a:r>
+              <a:rPr lang="en-US" i="1" dirty="0" smtClean="0">
+                <a:solidFill>
+                  <a:srgbClr val="0000FF"/>
+                </a:solidFill>
+                <a:latin typeface="Andale Mono"/>
+                <a:cs typeface="Andale Mono"/>
+              </a:rPr>
+              <a:t>exture </a:t>
+            </a:r>
+            <a:r>
+              <a:rPr lang="en-US" i="1" dirty="0" smtClean="0">
+                <a:solidFill>
+                  <a:srgbClr val="0000FF"/>
+                </a:solidFill>
+                <a:latin typeface="Andale Mono"/>
+                <a:cs typeface="Andale Mono"/>
+              </a:rPr>
+              <a:t>must be defined within a Program</a:t>
+            </a:r>
+            <a:endParaRPr lang="en-US" i="1" dirty="0" smtClean="0">
+              <a:solidFill>
+                <a:srgbClr val="0000FF"/>
+              </a:solidFill>
+              <a:latin typeface="Andale Mono"/>
+              <a:cs typeface="Andale Mono"/>
+            </a:endParaRPr>
+          </a:p>
+          <a:p>
+            <a:r>
+              <a:rPr lang="en-US" dirty="0" err="1" smtClean="0">
+                <a:solidFill>
+                  <a:schemeClr val="tx1"/>
+                </a:solidFill>
+                <a:latin typeface="Andale Mono"/>
+                <a:cs typeface="Andale Mono"/>
+              </a:rPr>
+              <a:t>UCL_Texture</a:t>
+            </a:r>
+            <a:r>
+              <a:rPr lang="en-US" dirty="0" smtClean="0">
+                <a:solidFill>
+                  <a:schemeClr val="tx1"/>
+                </a:solidFill>
+                <a:latin typeface="Andale Mono"/>
+                <a:cs typeface="Andale Mono"/>
+              </a:rPr>
+              <a:t> </a:t>
+            </a:r>
+            <a:r>
+              <a:rPr lang="en-US" dirty="0" err="1" smtClean="0">
+                <a:solidFill>
+                  <a:schemeClr val="tx1"/>
+                </a:solidFill>
+                <a:latin typeface="Andale Mono"/>
+                <a:cs typeface="Andale Mono"/>
+              </a:rPr>
+              <a:t>my_tex(my_program,”texture_name</a:t>
+            </a:r>
+            <a:r>
+              <a:rPr lang="en-US" dirty="0" smtClean="0">
+                <a:solidFill>
+                  <a:schemeClr val="tx1"/>
+                </a:solidFill>
+                <a:latin typeface="Andale Mono"/>
+                <a:cs typeface="Andale Mono"/>
+              </a:rPr>
+              <a:t>”);</a:t>
+            </a:r>
+          </a:p>
+          <a:p>
+            <a:r>
+              <a:rPr lang="en-US" i="1" dirty="0" smtClean="0">
+                <a:solidFill>
+                  <a:srgbClr val="0000FF"/>
+                </a:solidFill>
+                <a:latin typeface="Andale Mono"/>
+                <a:cs typeface="Andale Mono"/>
+              </a:rPr>
+              <a:t>//</a:t>
+            </a:r>
+            <a:r>
+              <a:rPr lang="en-US" i="1" dirty="0" smtClean="0">
+                <a:solidFill>
+                  <a:srgbClr val="0000FF"/>
+                </a:solidFill>
+                <a:latin typeface="Andale Mono"/>
+                <a:cs typeface="Andale Mono"/>
+              </a:rPr>
+              <a:t> -- or –</a:t>
+            </a:r>
+            <a:endParaRPr lang="en-US" dirty="0" smtClean="0">
+              <a:solidFill>
+                <a:schemeClr val="tx1"/>
+              </a:solidFill>
+              <a:latin typeface="Andale Mono"/>
+              <a:cs typeface="Andale Mono"/>
+            </a:endParaRPr>
+          </a:p>
+          <a:p>
+            <a:r>
+              <a:rPr lang="en-US" dirty="0" err="1" smtClean="0">
+                <a:solidFill>
+                  <a:schemeClr val="tx1"/>
+                </a:solidFill>
+                <a:latin typeface="Andale Mono"/>
+                <a:cs typeface="Andale Mono"/>
+              </a:rPr>
+              <a:t>UCL_Texture</a:t>
+            </a:r>
+            <a:r>
+              <a:rPr lang="en-US" dirty="0" smtClean="0">
+                <a:solidFill>
+                  <a:schemeClr val="tx1"/>
+                </a:solidFill>
+                <a:latin typeface="Andale Mono"/>
+                <a:cs typeface="Andale Mono"/>
+              </a:rPr>
+              <a:t> </a:t>
+            </a:r>
+            <a:r>
+              <a:rPr lang="en-US" dirty="0" err="1" smtClean="0">
+                <a:solidFill>
+                  <a:schemeClr val="tx1"/>
+                </a:solidFill>
+                <a:latin typeface="Andale Mono"/>
+                <a:cs typeface="Andale Mono"/>
+              </a:rPr>
+              <a:t>my_tex</a:t>
+            </a:r>
+            <a:r>
+              <a:rPr lang="en-US" dirty="0" smtClean="0">
+                <a:solidFill>
+                  <a:schemeClr val="tx1"/>
+                </a:solidFill>
+                <a:latin typeface="Andale Mono"/>
+                <a:cs typeface="Andale Mono"/>
+              </a:rPr>
+              <a:t>;</a:t>
+            </a:r>
+          </a:p>
+          <a:p>
+            <a:r>
+              <a:rPr lang="en-US" dirty="0" err="1" smtClean="0">
+                <a:solidFill>
+                  <a:schemeClr val="tx1"/>
+                </a:solidFill>
+                <a:latin typeface="Andale Mono"/>
+                <a:cs typeface="Andale Mono"/>
+              </a:rPr>
+              <a:t>m</a:t>
+            </a:r>
+            <a:r>
+              <a:rPr lang="en-US" dirty="0" err="1" smtClean="0">
+                <a:solidFill>
+                  <a:schemeClr val="tx1"/>
+                </a:solidFill>
+                <a:latin typeface="Andale Mono"/>
+                <a:cs typeface="Andale Mono"/>
+              </a:rPr>
+              <a:t>y_tex.get_texture(my_program,”texture_name</a:t>
+            </a:r>
+            <a:r>
+              <a:rPr lang="en-US" dirty="0" smtClean="0">
+                <a:solidFill>
+                  <a:schemeClr val="tx1"/>
+                </a:solidFill>
+                <a:latin typeface="Andale Mono"/>
+                <a:cs typeface="Andale Mono"/>
+              </a:rPr>
+              <a:t>”);</a:t>
+            </a:r>
+            <a:endParaRPr lang="en-US" dirty="0" smtClean="0">
+              <a:solidFill>
+                <a:schemeClr val="tx1"/>
+              </a:solidFill>
+              <a:latin typeface="Andale Mono"/>
+              <a:cs typeface="Andale Mono"/>
+            </a:endParaRPr>
+          </a:p>
+        </p:txBody>
+      </p:sp>
+      <p:sp>
+        <p:nvSpPr>
+          <p:cNvPr id="5" name="Content Placeholder 2"/>
+          <p:cNvSpPr txBox="1">
+            <a:spLocks/>
+          </p:cNvSpPr>
+          <p:nvPr/>
+        </p:nvSpPr>
+        <p:spPr>
+          <a:xfrm>
+            <a:off x="1066800" y="3739597"/>
+            <a:ext cx="7772400" cy="576116"/>
+          </a:xfrm>
+          <a:prstGeom prst="rect">
+            <a:avLst/>
+          </a:prstGeom>
+        </p:spPr>
+        <p:txBody>
+          <a:bodyPr vert="horz">
+            <a:normAutofit/>
+          </a:bodyPr>
+          <a:lstStyle/>
+          <a:p>
+            <a:pPr marL="274320" marR="0" lvl="0" indent="-274320" algn="l" defTabSz="914400" rtl="0" eaLnBrk="1" fontAlgn="auto" latinLnBrk="0" hangingPunct="1">
+              <a:lnSpc>
+                <a:spcPct val="100000"/>
+              </a:lnSpc>
+              <a:spcBef>
+                <a:spcPts val="580"/>
+              </a:spcBef>
+              <a:spcAft>
+                <a:spcPts val="0"/>
+              </a:spcAft>
+              <a:buClr>
+                <a:schemeClr val="accent1"/>
+              </a:buClr>
+              <a:buSzPct val="85000"/>
+              <a:buFont typeface="Wingdings 2"/>
+              <a:buChar char=""/>
+              <a:tabLst/>
+              <a:defRPr/>
+            </a:pPr>
+            <a:r>
+              <a:rPr kumimoji="0" lang="en-US" sz="2600" b="0" i="0" u="none" strike="noStrike" kern="1200" cap="none" spc="0" normalizeH="0" baseline="0" noProof="0" dirty="0" smtClean="0">
+                <a:ln>
+                  <a:noFill/>
+                </a:ln>
+                <a:solidFill>
+                  <a:schemeClr val="tx1"/>
+                </a:solidFill>
+                <a:effectLst/>
+                <a:uLnTx/>
+                <a:uFillTx/>
+                <a:latin typeface="+mn-lt"/>
+                <a:ea typeface="+mn-ea"/>
+                <a:cs typeface="+mn-cs"/>
+              </a:rPr>
+              <a:t>CUDA Runtime</a:t>
+            </a:r>
+          </a:p>
+        </p:txBody>
+      </p:sp>
+      <p:sp>
+        <p:nvSpPr>
+          <p:cNvPr id="6" name="TextBox 5"/>
+          <p:cNvSpPr txBox="1"/>
+          <p:nvPr/>
+        </p:nvSpPr>
+        <p:spPr>
+          <a:xfrm>
+            <a:off x="962498" y="4315714"/>
+            <a:ext cx="6806119" cy="2308324"/>
+          </a:xfrm>
+          <a:prstGeom prst="rect">
+            <a:avLst/>
+          </a:prstGeom>
+        </p:spPr>
+        <p:style>
+          <a:lnRef idx="2">
+            <a:schemeClr val="accent5"/>
+          </a:lnRef>
+          <a:fillRef idx="1">
+            <a:schemeClr val="lt1"/>
+          </a:fillRef>
+          <a:effectRef idx="0">
+            <a:schemeClr val="accent5"/>
+          </a:effectRef>
+          <a:fontRef idx="minor">
+            <a:schemeClr val="dk1"/>
+          </a:fontRef>
+        </p:style>
+        <p:txBody>
+          <a:bodyPr wrap="square" rtlCol="0">
+            <a:spAutoFit/>
+          </a:bodyPr>
+          <a:lstStyle/>
+          <a:p>
+            <a:r>
+              <a:rPr lang="en-US" dirty="0" smtClean="0">
+                <a:solidFill>
+                  <a:schemeClr val="tx1"/>
+                </a:solidFill>
+                <a:latin typeface="Andale Mono"/>
+                <a:cs typeface="Andale Mono"/>
+              </a:rPr>
+              <a:t>#include “</a:t>
+            </a:r>
+            <a:r>
+              <a:rPr lang="en-US" dirty="0" err="1" smtClean="0">
+                <a:solidFill>
+                  <a:schemeClr val="tx1"/>
+                </a:solidFill>
+                <a:latin typeface="Andale Mono"/>
+                <a:cs typeface="Andale Mono"/>
+              </a:rPr>
+              <a:t>nvc_texture.h</a:t>
+            </a:r>
+            <a:r>
+              <a:rPr lang="en-US" dirty="0" smtClean="0">
+                <a:solidFill>
+                  <a:schemeClr val="tx1"/>
+                </a:solidFill>
+                <a:latin typeface="Andale Mono"/>
+                <a:cs typeface="Andale Mono"/>
+              </a:rPr>
+              <a:t>”</a:t>
+            </a:r>
+          </a:p>
+          <a:p>
+            <a:r>
+              <a:rPr lang="en-US" i="1" dirty="0" smtClean="0">
+                <a:solidFill>
+                  <a:srgbClr val="0000FF"/>
+                </a:solidFill>
+                <a:latin typeface="Andale Mono"/>
+                <a:cs typeface="Andale Mono"/>
+              </a:rPr>
+              <a:t>/</a:t>
+            </a:r>
+            <a:r>
+              <a:rPr lang="en-US" i="1" dirty="0" smtClean="0">
+                <a:solidFill>
+                  <a:srgbClr val="0000FF"/>
+                </a:solidFill>
+                <a:latin typeface="Andale Mono"/>
+                <a:cs typeface="Andale Mono"/>
+              </a:rPr>
+              <a:t>/</a:t>
+            </a:r>
+            <a:r>
+              <a:rPr lang="en-US" i="1" dirty="0" smtClean="0">
+                <a:solidFill>
+                  <a:srgbClr val="0000FF"/>
+                </a:solidFill>
+                <a:latin typeface="Andale Mono"/>
+                <a:cs typeface="Andale Mono"/>
+              </a:rPr>
+              <a:t> </a:t>
+            </a:r>
+            <a:r>
+              <a:rPr lang="en-US" i="1" dirty="0" smtClean="0">
+                <a:solidFill>
+                  <a:srgbClr val="0000FF"/>
+                </a:solidFill>
+                <a:latin typeface="Andale Mono"/>
+                <a:cs typeface="Andale Mono"/>
+              </a:rPr>
+              <a:t>T</a:t>
+            </a:r>
+            <a:r>
+              <a:rPr lang="en-US" i="1" dirty="0" smtClean="0">
+                <a:solidFill>
+                  <a:srgbClr val="0000FF"/>
+                </a:solidFill>
+                <a:latin typeface="Andale Mono"/>
+                <a:cs typeface="Andale Mono"/>
+              </a:rPr>
+              <a:t>exture </a:t>
+            </a:r>
+            <a:r>
+              <a:rPr lang="en-US" i="1" dirty="0" smtClean="0">
+                <a:solidFill>
+                  <a:srgbClr val="0000FF"/>
+                </a:solidFill>
+                <a:latin typeface="Andale Mono"/>
+                <a:cs typeface="Andale Mono"/>
+              </a:rPr>
+              <a:t>must be defined within same file</a:t>
+            </a:r>
+            <a:endParaRPr lang="en-US" i="1" dirty="0" smtClean="0">
+              <a:solidFill>
+                <a:srgbClr val="0000FF"/>
+              </a:solidFill>
+              <a:latin typeface="Andale Mono"/>
+              <a:cs typeface="Andale Mono"/>
+            </a:endParaRPr>
+          </a:p>
+          <a:p>
+            <a:r>
+              <a:rPr lang="en-US" dirty="0" smtClean="0">
+                <a:solidFill>
+                  <a:schemeClr val="tx1"/>
+                </a:solidFill>
+                <a:latin typeface="Andale Mono"/>
+                <a:cs typeface="Andale Mono"/>
+              </a:rPr>
+              <a:t>t</a:t>
+            </a:r>
+            <a:r>
+              <a:rPr lang="en-US" dirty="0" smtClean="0">
+                <a:solidFill>
+                  <a:schemeClr val="tx1"/>
+                </a:solidFill>
+                <a:latin typeface="Andale Mono"/>
+                <a:cs typeface="Andale Mono"/>
+              </a:rPr>
+              <a:t>exture&lt;float2&gt; </a:t>
+            </a:r>
+            <a:r>
+              <a:rPr lang="en-US" dirty="0" err="1" smtClean="0">
+                <a:solidFill>
+                  <a:schemeClr val="tx1"/>
+                </a:solidFill>
+                <a:latin typeface="Andale Mono"/>
+                <a:cs typeface="Andale Mono"/>
+              </a:rPr>
+              <a:t>tex</a:t>
+            </a:r>
+            <a:r>
+              <a:rPr lang="en-US" dirty="0" smtClean="0">
+                <a:solidFill>
+                  <a:schemeClr val="tx1"/>
+                </a:solidFill>
+                <a:latin typeface="Andale Mono"/>
+                <a:cs typeface="Andale Mono"/>
+              </a:rPr>
+              <a:t>;</a:t>
+            </a:r>
+          </a:p>
+          <a:p>
+            <a:r>
+              <a:rPr lang="en-US" dirty="0" smtClean="0">
+                <a:solidFill>
+                  <a:schemeClr val="tx1"/>
+                </a:solidFill>
+                <a:latin typeface="Andale Mono"/>
+                <a:cs typeface="Andale Mono"/>
+              </a:rPr>
+              <a:t> </a:t>
+            </a:r>
+          </a:p>
+          <a:p>
+            <a:r>
+              <a:rPr lang="en-US" dirty="0" err="1" smtClean="0">
+                <a:solidFill>
+                  <a:schemeClr val="tx1"/>
+                </a:solidFill>
+                <a:latin typeface="Andale Mono"/>
+                <a:cs typeface="Andale Mono"/>
+              </a:rPr>
+              <a:t>UCL_Texture</a:t>
+            </a:r>
+            <a:r>
+              <a:rPr lang="en-US" dirty="0" smtClean="0">
+                <a:solidFill>
+                  <a:schemeClr val="tx1"/>
+                </a:solidFill>
+                <a:latin typeface="Andale Mono"/>
+                <a:cs typeface="Andale Mono"/>
+              </a:rPr>
+              <a:t> </a:t>
+            </a:r>
+            <a:r>
+              <a:rPr lang="en-US" dirty="0" err="1" smtClean="0">
+                <a:solidFill>
+                  <a:schemeClr val="tx1"/>
+                </a:solidFill>
+                <a:latin typeface="Andale Mono"/>
+                <a:cs typeface="Andale Mono"/>
+              </a:rPr>
+              <a:t>my_tex(tex</a:t>
+            </a:r>
+            <a:r>
+              <a:rPr lang="en-US" dirty="0" smtClean="0">
+                <a:solidFill>
+                  <a:schemeClr val="tx1"/>
+                </a:solidFill>
+                <a:latin typeface="Andale Mono"/>
+                <a:cs typeface="Andale Mono"/>
+              </a:rPr>
+              <a:t>);</a:t>
+            </a:r>
+          </a:p>
+          <a:p>
+            <a:r>
+              <a:rPr lang="en-US" i="1" dirty="0" smtClean="0">
+                <a:solidFill>
+                  <a:srgbClr val="0000FF"/>
+                </a:solidFill>
+                <a:latin typeface="Andale Mono"/>
+                <a:cs typeface="Andale Mono"/>
+              </a:rPr>
+              <a:t>//</a:t>
+            </a:r>
+            <a:r>
+              <a:rPr lang="en-US" i="1" dirty="0" smtClean="0">
+                <a:solidFill>
+                  <a:srgbClr val="0000FF"/>
+                </a:solidFill>
+                <a:latin typeface="Andale Mono"/>
+                <a:cs typeface="Andale Mono"/>
+              </a:rPr>
+              <a:t> -- or –</a:t>
+            </a:r>
+            <a:endParaRPr lang="en-US" dirty="0" smtClean="0">
+              <a:solidFill>
+                <a:schemeClr val="tx1"/>
+              </a:solidFill>
+              <a:latin typeface="Andale Mono"/>
+              <a:cs typeface="Andale Mono"/>
+            </a:endParaRPr>
+          </a:p>
+          <a:p>
+            <a:r>
+              <a:rPr lang="en-US" dirty="0" err="1" smtClean="0">
+                <a:solidFill>
+                  <a:schemeClr val="tx1"/>
+                </a:solidFill>
+                <a:latin typeface="Andale Mono"/>
+                <a:cs typeface="Andale Mono"/>
+              </a:rPr>
+              <a:t>UCL_Texture</a:t>
+            </a:r>
+            <a:r>
+              <a:rPr lang="en-US" dirty="0" smtClean="0">
+                <a:solidFill>
+                  <a:schemeClr val="tx1"/>
+                </a:solidFill>
+                <a:latin typeface="Andale Mono"/>
+                <a:cs typeface="Andale Mono"/>
+              </a:rPr>
+              <a:t> </a:t>
+            </a:r>
+            <a:r>
+              <a:rPr lang="en-US" dirty="0" err="1" smtClean="0">
+                <a:solidFill>
+                  <a:schemeClr val="tx1"/>
+                </a:solidFill>
+                <a:latin typeface="Andale Mono"/>
+                <a:cs typeface="Andale Mono"/>
+              </a:rPr>
+              <a:t>my_tex</a:t>
+            </a:r>
+            <a:r>
+              <a:rPr lang="en-US" dirty="0" smtClean="0">
+                <a:solidFill>
+                  <a:schemeClr val="tx1"/>
+                </a:solidFill>
+                <a:latin typeface="Andale Mono"/>
+                <a:cs typeface="Andale Mono"/>
+              </a:rPr>
+              <a:t>;</a:t>
+            </a:r>
+          </a:p>
+          <a:p>
+            <a:r>
+              <a:rPr lang="en-US" dirty="0" err="1" smtClean="0">
+                <a:solidFill>
+                  <a:schemeClr val="tx1"/>
+                </a:solidFill>
+                <a:latin typeface="Andale Mono"/>
+                <a:cs typeface="Andale Mono"/>
+              </a:rPr>
+              <a:t>m</a:t>
+            </a:r>
+            <a:r>
+              <a:rPr lang="en-US" dirty="0" err="1" smtClean="0">
+                <a:solidFill>
+                  <a:schemeClr val="tx1"/>
+                </a:solidFill>
+                <a:latin typeface="Andale Mono"/>
+                <a:cs typeface="Andale Mono"/>
+              </a:rPr>
+              <a:t>y_tex.get_texture(tex</a:t>
+            </a:r>
+            <a:r>
+              <a:rPr lang="en-US" dirty="0" smtClean="0">
+                <a:solidFill>
+                  <a:schemeClr val="tx1"/>
+                </a:solidFill>
+                <a:latin typeface="Andale Mono"/>
+                <a:cs typeface="Andale Mono"/>
+              </a:rPr>
+              <a:t>);</a:t>
+            </a:r>
+            <a:endParaRPr lang="en-US" dirty="0" smtClean="0">
+              <a:solidFill>
+                <a:schemeClr val="tx1"/>
+              </a:solidFill>
+              <a:latin typeface="Andale Mono"/>
+              <a:cs typeface="Andale Mono"/>
+            </a:endParaRPr>
+          </a:p>
+        </p:txBody>
+      </p:sp>
+    </p:spTree>
+  </p:cSld>
+  <p:clrMapOvr>
+    <a:masterClrMapping/>
+  </p:clrMapOvr>
+</p:sld>
+</file>
+
+<file path=ppt/slides/slide67.xml><?xml version="1.0" encoding="utf-8"?>
+<p:sld xmlns:a="http://schemas.openxmlformats.org/drawingml/2006/main" xmlns:r="http://schemas.openxmlformats.org/officeDocument/2006/relationships" xmlns:mc="http://schemas.openxmlformats.org/markup-compatibility/2006" xmlns:mv="urn:schemas-microsoft-com:mac:vml" xmlns:p="http://schemas.openxmlformats.org/presentationml/2006/main" mc:Ignorable="mv" mc:PreserveAttributes="mv:*">
+  <p:cSld>
+    <p:spTree>
+      <p:nvGrpSpPr>
+        <p:cNvPr id="1" name=""/>
+        <p:cNvGrpSpPr/>
+        <p:nvPr/>
+      </p:nvGrpSpPr>
+      <p:grpSpPr>
+        <a:xfrm>
+          <a:off x="0" y="0"/>
+          <a:ext cx="0" cy="0"/>
+          <a:chOff x="0" y="0"/>
+          <a:chExt cx="0" cy="0"/>
+        </a:xfrm>
+      </p:grpSpPr>
+      <p:sp>
+        <p:nvSpPr>
+          <p:cNvPr id="2" name="Title 1"/>
+          <p:cNvSpPr>
+            <a:spLocks noGrp="1"/>
+          </p:cNvSpPr>
+          <p:nvPr>
+            <p:ph type="title"/>
+          </p:nvPr>
+        </p:nvSpPr>
+        <p:spPr/>
+        <p:txBody>
+          <a:bodyPr/>
+          <a:lstStyle/>
+          <a:p>
+            <a:r>
+              <a:rPr lang="en-US" dirty="0" smtClean="0"/>
+              <a:t>Binding a texture</a:t>
+            </a:r>
+            <a:endParaRPr lang="en-US" dirty="0"/>
+          </a:p>
+        </p:txBody>
+      </p:sp>
+      <p:sp>
+        <p:nvSpPr>
+          <p:cNvPr id="4" name="TextBox 3"/>
+          <p:cNvSpPr txBox="1"/>
+          <p:nvPr/>
+        </p:nvSpPr>
+        <p:spPr>
+          <a:xfrm>
+            <a:off x="914400" y="1656842"/>
+            <a:ext cx="6854217" cy="2585323"/>
+          </a:xfrm>
+          <a:prstGeom prst="rect">
+            <a:avLst/>
+          </a:prstGeom>
+        </p:spPr>
+        <p:style>
+          <a:lnRef idx="2">
+            <a:schemeClr val="accent5"/>
+          </a:lnRef>
+          <a:fillRef idx="1">
+            <a:schemeClr val="lt1"/>
+          </a:fillRef>
+          <a:effectRef idx="0">
+            <a:schemeClr val="accent5"/>
+          </a:effectRef>
+          <a:fontRef idx="minor">
+            <a:schemeClr val="dk1"/>
+          </a:fontRef>
+        </p:style>
+        <p:txBody>
+          <a:bodyPr wrap="square" rtlCol="0">
+            <a:spAutoFit/>
+          </a:bodyPr>
+          <a:lstStyle/>
+          <a:p>
+            <a:r>
+              <a:rPr lang="en-US" i="1" dirty="0" smtClean="0">
+                <a:solidFill>
+                  <a:srgbClr val="0000FF"/>
+                </a:solidFill>
+                <a:latin typeface="Andale Mono"/>
+                <a:cs typeface="Andale Mono"/>
+              </a:rPr>
+              <a:t>// To bind a float array with vector length 2</a:t>
+            </a:r>
+            <a:endParaRPr lang="en-US" dirty="0" smtClean="0">
+              <a:solidFill>
+                <a:schemeClr val="tx1"/>
+              </a:solidFill>
+              <a:latin typeface="Andale Mono"/>
+              <a:cs typeface="Andale Mono"/>
+            </a:endParaRPr>
+          </a:p>
+          <a:p>
+            <a:r>
+              <a:rPr lang="en-US" dirty="0" smtClean="0">
+                <a:solidFill>
+                  <a:schemeClr val="tx1"/>
+                </a:solidFill>
+                <a:latin typeface="Andale Mono"/>
+                <a:cs typeface="Andale Mono"/>
+              </a:rPr>
+              <a:t>m</a:t>
+            </a:r>
+            <a:r>
+              <a:rPr lang="en-US" dirty="0" smtClean="0">
+                <a:solidFill>
+                  <a:schemeClr val="tx1"/>
+                </a:solidFill>
+                <a:latin typeface="Andale Mono"/>
+                <a:cs typeface="Andale Mono"/>
+              </a:rPr>
+              <a:t>y_tex.bind_float(my_array.begin(),2);</a:t>
+            </a:r>
+          </a:p>
+          <a:p>
+            <a:endParaRPr lang="en-US" dirty="0" smtClean="0">
+              <a:solidFill>
+                <a:schemeClr val="tx1"/>
+              </a:solidFill>
+              <a:latin typeface="Andale Mono"/>
+              <a:cs typeface="Andale Mono"/>
+            </a:endParaRPr>
+          </a:p>
+          <a:p>
+            <a:r>
+              <a:rPr lang="en-US" i="1" dirty="0" smtClean="0">
+                <a:solidFill>
+                  <a:srgbClr val="0000FF"/>
+                </a:solidFill>
+                <a:latin typeface="Andale Mono"/>
+                <a:cs typeface="Andale Mono"/>
+              </a:rPr>
+              <a:t>//</a:t>
+            </a:r>
+            <a:r>
+              <a:rPr lang="en-US" i="1" dirty="0" smtClean="0">
+                <a:solidFill>
+                  <a:srgbClr val="0000FF"/>
+                </a:solidFill>
+                <a:latin typeface="Andale Mono"/>
+                <a:cs typeface="Andale Mono"/>
+              </a:rPr>
+              <a:t> Texture is fetched within a kernel using</a:t>
+            </a:r>
+          </a:p>
+          <a:p>
+            <a:r>
+              <a:rPr lang="en-US" i="1" dirty="0" smtClean="0">
+                <a:solidFill>
+                  <a:srgbClr val="0000FF"/>
+                </a:solidFill>
+                <a:latin typeface="Andale Mono"/>
+                <a:cs typeface="Andale Mono"/>
+              </a:rPr>
+              <a:t>// tex1Dfetch(tex,i);</a:t>
+            </a:r>
+          </a:p>
+          <a:p>
+            <a:endParaRPr lang="en-US" i="1" dirty="0" smtClean="0">
+              <a:solidFill>
+                <a:srgbClr val="0000FF"/>
+              </a:solidFill>
+              <a:latin typeface="Andale Mono"/>
+              <a:cs typeface="Andale Mono"/>
+            </a:endParaRPr>
+          </a:p>
+          <a:p>
+            <a:r>
+              <a:rPr lang="en-US" i="1" dirty="0" smtClean="0">
+                <a:solidFill>
+                  <a:srgbClr val="0000FF"/>
+                </a:solidFill>
+                <a:latin typeface="Andale Mono"/>
+                <a:cs typeface="Andale Mono"/>
+              </a:rPr>
+              <a:t>/</a:t>
+            </a:r>
+            <a:r>
+              <a:rPr lang="en-US" i="1" dirty="0" smtClean="0">
+                <a:solidFill>
+                  <a:srgbClr val="0000FF"/>
+                </a:solidFill>
+                <a:latin typeface="Andale Mono"/>
+                <a:cs typeface="Andale Mono"/>
+              </a:rPr>
+              <a:t>/ To</a:t>
+            </a:r>
+            <a:r>
+              <a:rPr lang="en-US" i="1" dirty="0" smtClean="0">
+                <a:solidFill>
+                  <a:srgbClr val="0000FF"/>
+                </a:solidFill>
+                <a:latin typeface="Andale Mono"/>
+                <a:cs typeface="Andale Mono"/>
+              </a:rPr>
+              <a:t> unbind the array</a:t>
+            </a:r>
+            <a:endParaRPr lang="en-US" dirty="0" smtClean="0">
+              <a:solidFill>
+                <a:schemeClr val="tx1"/>
+              </a:solidFill>
+              <a:latin typeface="Andale Mono"/>
+              <a:cs typeface="Andale Mono"/>
+            </a:endParaRPr>
+          </a:p>
+          <a:p>
+            <a:r>
+              <a:rPr lang="en-US" dirty="0" err="1" smtClean="0">
+                <a:solidFill>
+                  <a:schemeClr val="tx1"/>
+                </a:solidFill>
+                <a:latin typeface="Andale Mono"/>
+                <a:cs typeface="Andale Mono"/>
+              </a:rPr>
+              <a:t>my_tex.unbind</a:t>
+            </a:r>
+            <a:r>
+              <a:rPr lang="en-US" dirty="0" smtClean="0">
+                <a:solidFill>
+                  <a:schemeClr val="tx1"/>
+                </a:solidFill>
+                <a:latin typeface="Andale Mono"/>
+                <a:cs typeface="Andale Mono"/>
+              </a:rPr>
+              <a:t>()</a:t>
+            </a:r>
+            <a:r>
+              <a:rPr lang="en-US" dirty="0" smtClean="0">
+                <a:solidFill>
+                  <a:schemeClr val="tx1"/>
+                </a:solidFill>
+                <a:latin typeface="Andale Mono"/>
+                <a:cs typeface="Andale Mono"/>
+              </a:rPr>
+              <a:t>;</a:t>
+            </a:r>
+          </a:p>
+          <a:p>
+            <a:endParaRPr lang="en-US" dirty="0" smtClean="0">
+              <a:solidFill>
+                <a:schemeClr val="tx1"/>
+              </a:solidFill>
+              <a:latin typeface="Andale Mono"/>
+              <a:cs typeface="Andale Mono"/>
+            </a:endParaRPr>
+          </a:p>
+        </p:txBody>
+      </p:sp>
+    </p:spTree>
+  </p:cSld>
+  <p:clrMapOvr>
+    <a:masterClrMapping/>
+  </p:clrMapOvr>
+</p:sld>
+</file>
+
+<file path=ppt/slides/slide68.xml><?xml version="1.0" encoding="utf-8"?>
+<p:sld xmlns:a="http://schemas.openxmlformats.org/drawingml/2006/main" xmlns:r="http://schemas.openxmlformats.org/officeDocument/2006/relationships" xmlns:mc="http://schemas.openxmlformats.org/markup-compatibility/2006" xmlns:mv="urn:schemas-microsoft-com:mac:vml" xmlns:p="http://schemas.openxmlformats.org/presentationml/2006/main" mc:Ignorable="mv" mc:PreserveAttributes="mv:*">
+  <p:cSld>
+    <p:spTree>
+      <p:nvGrpSpPr>
+        <p:cNvPr id="1" name=""/>
+        <p:cNvGrpSpPr/>
+        <p:nvPr/>
+      </p:nvGrpSpPr>
+      <p:grpSpPr>
+        <a:xfrm>
+          <a:off x="0" y="0"/>
+          <a:ext cx="0" cy="0"/>
+          <a:chOff x="0" y="0"/>
+          <a:chExt cx="0" cy="0"/>
+        </a:xfrm>
+      </p:grpSpPr>
+      <p:sp>
+        <p:nvSpPr>
           <p:cNvPr id="3" name="Subtitle 2"/>
           <p:cNvSpPr>
             <a:spLocks noGrp="1"/>
@@ -21242,7 +22480,7 @@
 </p:sld>
 </file>
 
-<file path=ppt/slides/slide65.xml><?xml version="1.0" encoding="utf-8"?>
+<file path=ppt/slides/slide69.xml><?xml version="1.0" encoding="utf-8"?>
 <p:sld xmlns:a="http://schemas.openxmlformats.org/drawingml/2006/main" xmlns:r="http://schemas.openxmlformats.org/officeDocument/2006/relationships" xmlns:mc="http://schemas.openxmlformats.org/markup-compatibility/2006" xmlns:mv="urn:schemas-microsoft-com:mac:vml" xmlns:p="http://schemas.openxmlformats.org/presentationml/2006/main" mc:Ignorable="mv" mc:PreserveAttributes="mv:*">
   <p:cSld>
     <p:spTree>

</xml_diff>

<commit_message>
GERYON: Changed OpenCL byte alignment for matrices to 256. 2D memcpy is now 1D if the pitch is the same and certain criteria are met. Removed dos characters.
</commit_message>
<xml_diff>
--- a/geryon.pptx
+++ b/geryon.pptx
@@ -3829,7 +3829,6 @@
               <a:rPr lang="en-US" sz="1200" dirty="0" smtClean="0"/>
               <a:t>W. Michael Brown</a:t>
             </a:r>
-            <a:endParaRPr lang="en-US" sz="1200" dirty="0" smtClean="0"/>
           </a:p>
           <a:p>
             <a:pPr algn="r"/>
@@ -20536,7 +20535,26 @@
             </a:r>
             <a:r>
               <a:rPr lang="en-US" i="1" dirty="0" smtClean="0"/>
-              <a:t>(unlikely to improve performance)</a:t>
+              <a:t>(unlikely to improve performance</a:t>
+            </a:r>
+            <a:r>
+              <a:rPr lang="en-US" i="1" dirty="0" smtClean="0"/>
+              <a:t>)</a:t>
+            </a:r>
+          </a:p>
+          <a:p>
+            <a:pPr lvl="1"/>
+            <a:r>
+              <a:rPr lang="en-US" dirty="0" smtClean="0"/>
+              <a:t>UCL_SYNC_DEBUG – Block after each device call and check for error (</a:t>
+            </a:r>
+            <a:r>
+              <a:rPr lang="en-US" i="1" dirty="0" smtClean="0"/>
+              <a:t>currently blocking will only be performed for CUDA</a:t>
+            </a:r>
+            <a:r>
+              <a:rPr lang="en-US" dirty="0" smtClean="0"/>
+              <a:t>)</a:t>
             </a:r>
           </a:p>
         </p:txBody>
@@ -21518,8 +21536,52 @@
                 <a:latin typeface="Andale Mono"/>
                 <a:cs typeface="Andale Mono"/>
               </a:rPr>
-              <a:t>/</a:t>
-            </a:r>
+              <a:t>// Texture must be defined within a Program</a:t>
+            </a:r>
+          </a:p>
+          <a:p>
+            <a:r>
+              <a:rPr lang="en-US" dirty="0" err="1" smtClean="0">
+                <a:solidFill>
+                  <a:schemeClr val="tx1"/>
+                </a:solidFill>
+                <a:latin typeface="Andale Mono"/>
+                <a:cs typeface="Andale Mono"/>
+              </a:rPr>
+              <a:t>UCL_Texture</a:t>
+            </a:r>
+            <a:r>
+              <a:rPr lang="en-US" dirty="0" smtClean="0">
+                <a:solidFill>
+                  <a:schemeClr val="tx1"/>
+                </a:solidFill>
+                <a:latin typeface="Andale Mono"/>
+                <a:cs typeface="Andale Mono"/>
+              </a:rPr>
+              <a:t> </a:t>
+            </a:r>
+            <a:r>
+              <a:rPr lang="en-US" dirty="0" err="1" smtClean="0">
+                <a:solidFill>
+                  <a:schemeClr val="tx1"/>
+                </a:solidFill>
+                <a:latin typeface="Andale Mono"/>
+                <a:cs typeface="Andale Mono"/>
+              </a:rPr>
+              <a:t>my_tex(my_program,”texture_name</a:t>
+            </a:r>
+            <a:r>
+              <a:rPr lang="en-US" dirty="0" smtClean="0">
+                <a:solidFill>
+                  <a:schemeClr val="tx1"/>
+                </a:solidFill>
+                <a:latin typeface="Andale Mono"/>
+                <a:cs typeface="Andale Mono"/>
+              </a:rPr>
+              <a:t>”);</a:t>
+            </a:r>
+          </a:p>
+          <a:p>
             <a:r>
               <a:rPr lang="en-US" i="1" dirty="0" smtClean="0">
                 <a:solidFill>
@@ -21528,118 +21590,7 @@
                 <a:latin typeface="Andale Mono"/>
                 <a:cs typeface="Andale Mono"/>
               </a:rPr>
-              <a:t>/</a:t>
-            </a:r>
-            <a:r>
-              <a:rPr lang="en-US" i="1" dirty="0" smtClean="0">
-                <a:solidFill>
-                  <a:srgbClr val="0000FF"/>
-                </a:solidFill>
-                <a:latin typeface="Andale Mono"/>
-                <a:cs typeface="Andale Mono"/>
-              </a:rPr>
-              <a:t> </a:t>
-            </a:r>
-            <a:r>
-              <a:rPr lang="en-US" i="1" dirty="0" smtClean="0">
-                <a:solidFill>
-                  <a:srgbClr val="0000FF"/>
-                </a:solidFill>
-                <a:latin typeface="Andale Mono"/>
-                <a:cs typeface="Andale Mono"/>
-              </a:rPr>
-              <a:t>T</a:t>
-            </a:r>
-            <a:r>
-              <a:rPr lang="en-US" i="1" dirty="0" smtClean="0">
-                <a:solidFill>
-                  <a:srgbClr val="0000FF"/>
-                </a:solidFill>
-                <a:latin typeface="Andale Mono"/>
-                <a:cs typeface="Andale Mono"/>
-              </a:rPr>
-              <a:t>exture </a:t>
-            </a:r>
-            <a:r>
-              <a:rPr lang="en-US" i="1" dirty="0" smtClean="0">
-                <a:solidFill>
-                  <a:srgbClr val="0000FF"/>
-                </a:solidFill>
-                <a:latin typeface="Andale Mono"/>
-                <a:cs typeface="Andale Mono"/>
-              </a:rPr>
-              <a:t>must be defined within a Program</a:t>
-            </a:r>
-            <a:endParaRPr lang="en-US" i="1" dirty="0" smtClean="0">
-              <a:solidFill>
-                <a:srgbClr val="0000FF"/>
-              </a:solidFill>
-              <a:latin typeface="Andale Mono"/>
-              <a:cs typeface="Andale Mono"/>
-            </a:endParaRPr>
-          </a:p>
-          <a:p>
-            <a:r>
-              <a:rPr lang="en-US" dirty="0" err="1" smtClean="0">
-                <a:solidFill>
-                  <a:schemeClr val="tx1"/>
-                </a:solidFill>
-                <a:latin typeface="Andale Mono"/>
-                <a:cs typeface="Andale Mono"/>
-              </a:rPr>
-              <a:t>UCL_Texture</a:t>
-            </a:r>
-            <a:r>
-              <a:rPr lang="en-US" dirty="0" smtClean="0">
-                <a:solidFill>
-                  <a:schemeClr val="tx1"/>
-                </a:solidFill>
-                <a:latin typeface="Andale Mono"/>
-                <a:cs typeface="Andale Mono"/>
-              </a:rPr>
-              <a:t> </a:t>
-            </a:r>
-            <a:r>
-              <a:rPr lang="en-US" dirty="0" err="1" smtClean="0">
-                <a:solidFill>
-                  <a:schemeClr val="tx1"/>
-                </a:solidFill>
-                <a:latin typeface="Andale Mono"/>
-                <a:cs typeface="Andale Mono"/>
-              </a:rPr>
-              <a:t>my_tex(my_program,”texture_name</a:t>
-            </a:r>
-            <a:r>
-              <a:rPr lang="en-US" dirty="0" smtClean="0">
-                <a:solidFill>
-                  <a:schemeClr val="tx1"/>
-                </a:solidFill>
-                <a:latin typeface="Andale Mono"/>
-                <a:cs typeface="Andale Mono"/>
-              </a:rPr>
-              <a:t>”);</a:t>
-            </a:r>
-          </a:p>
-          <a:p>
-            <a:r>
-              <a:rPr lang="en-US" i="1" dirty="0" smtClean="0">
-                <a:solidFill>
-                  <a:srgbClr val="0000FF"/>
-                </a:solidFill>
-                <a:latin typeface="Andale Mono"/>
-                <a:cs typeface="Andale Mono"/>
-              </a:rPr>
-              <a:t>//</a:t>
-            </a:r>
-            <a:r>
-              <a:rPr lang="en-US" i="1" dirty="0" smtClean="0">
-                <a:solidFill>
-                  <a:srgbClr val="0000FF"/>
-                </a:solidFill>
-                <a:latin typeface="Andale Mono"/>
-                <a:cs typeface="Andale Mono"/>
-              </a:rPr>
-              <a:t> -- or –</a:t>
+              <a:t>// -- or –</a:t>
             </a:r>
             <a:endParaRPr lang="en-US" dirty="0" smtClean="0">
               <a:solidFill>
@@ -21700,35 +21651,18 @@
                 <a:latin typeface="Andale Mono"/>
                 <a:cs typeface="Andale Mono"/>
               </a:rPr>
-              <a:t>m</a:t>
-            </a:r>
-            <a:r>
-              <a:rPr lang="en-US" dirty="0" err="1" smtClean="0">
+              <a:t>my_tex.get_texture(my_program,”texture_name</a:t>
+            </a:r>
+            <a:r>
+              <a:rPr lang="en-US" dirty="0" smtClean="0">
                 <a:solidFill>
                   <a:schemeClr val="tx1"/>
                 </a:solidFill>
                 <a:latin typeface="Andale Mono"/>
                 <a:cs typeface="Andale Mono"/>
               </a:rPr>
-              <a:t>y_tex.get_texture(my_program,”texture_name</a:t>
-            </a:r>
-            <a:r>
-              <a:rPr lang="en-US" dirty="0" smtClean="0">
-                <a:solidFill>
-                  <a:schemeClr val="tx1"/>
-                </a:solidFill>
-                <a:latin typeface="Andale Mono"/>
-                <a:cs typeface="Andale Mono"/>
-              </a:rPr>
               <a:t>”);</a:t>
             </a:r>
-            <a:endParaRPr lang="en-US" dirty="0" smtClean="0">
-              <a:solidFill>
-                <a:schemeClr val="tx1"/>
-              </a:solidFill>
-              <a:latin typeface="Andale Mono"/>
-              <a:cs typeface="Andale Mono"/>
-            </a:endParaRPr>
           </a:p>
         </p:txBody>
       </p:sp>
@@ -21869,8 +21803,96 @@
                 <a:latin typeface="Andale Mono"/>
                 <a:cs typeface="Andale Mono"/>
               </a:rPr>
-              <a:t>/</a:t>
-            </a:r>
+              <a:t>// Texture must be defined within same file</a:t>
+            </a:r>
+          </a:p>
+          <a:p>
+            <a:r>
+              <a:rPr lang="en-US" dirty="0" smtClean="0">
+                <a:solidFill>
+                  <a:schemeClr val="tx1"/>
+                </a:solidFill>
+                <a:latin typeface="Andale Mono"/>
+                <a:cs typeface="Andale Mono"/>
+              </a:rPr>
+              <a:t>texture&lt;float2&gt; </a:t>
+            </a:r>
+            <a:r>
+              <a:rPr lang="en-US" dirty="0" err="1" smtClean="0">
+                <a:solidFill>
+                  <a:schemeClr val="tx1"/>
+                </a:solidFill>
+                <a:latin typeface="Andale Mono"/>
+                <a:cs typeface="Andale Mono"/>
+              </a:rPr>
+              <a:t>tex</a:t>
+            </a:r>
+            <a:r>
+              <a:rPr lang="en-US" dirty="0" smtClean="0">
+                <a:solidFill>
+                  <a:schemeClr val="tx1"/>
+                </a:solidFill>
+                <a:latin typeface="Andale Mono"/>
+                <a:cs typeface="Andale Mono"/>
+              </a:rPr>
+              <a:t>;</a:t>
+            </a:r>
+          </a:p>
+          <a:p>
+            <a:r>
+              <a:rPr lang="en-US" dirty="0" smtClean="0">
+                <a:solidFill>
+                  <a:schemeClr val="tx1"/>
+                </a:solidFill>
+                <a:latin typeface="Andale Mono"/>
+                <a:cs typeface="Andale Mono"/>
+              </a:rPr>
+              <a:t> </a:t>
+            </a:r>
+          </a:p>
+          <a:p>
+            <a:r>
+              <a:rPr lang="en-US" dirty="0" err="1" smtClean="0">
+                <a:solidFill>
+                  <a:schemeClr val="tx1"/>
+                </a:solidFill>
+                <a:latin typeface="Andale Mono"/>
+                <a:cs typeface="Andale Mono"/>
+              </a:rPr>
+              <a:t>UCL_Texture</a:t>
+            </a:r>
+            <a:r>
+              <a:rPr lang="en-US" dirty="0" smtClean="0">
+                <a:solidFill>
+                  <a:schemeClr val="tx1"/>
+                </a:solidFill>
+                <a:latin typeface="Andale Mono"/>
+                <a:cs typeface="Andale Mono"/>
+              </a:rPr>
+              <a:t> </a:t>
+            </a:r>
+            <a:r>
+              <a:rPr lang="en-US" dirty="0" err="1" smtClean="0">
+                <a:solidFill>
+                  <a:schemeClr val="tx1"/>
+                </a:solidFill>
+                <a:latin typeface="Andale Mono"/>
+                <a:cs typeface="Andale Mono"/>
+              </a:rPr>
+              <a:t>my_tex(tex</a:t>
+            </a:r>
+            <a:r>
+              <a:rPr lang="en-US" dirty="0" smtClean="0">
+                <a:solidFill>
+                  <a:schemeClr val="tx1"/>
+                </a:solidFill>
+                <a:latin typeface="Andale Mono"/>
+                <a:cs typeface="Andale Mono"/>
+              </a:rPr>
+              <a:t>);</a:t>
+            </a:r>
+          </a:p>
+          <a:p>
             <a:r>
               <a:rPr lang="en-US" i="1" dirty="0" smtClean="0">
                 <a:solidFill>
@@ -21879,172 +21901,7 @@
                 <a:latin typeface="Andale Mono"/>
                 <a:cs typeface="Andale Mono"/>
               </a:rPr>
-              <a:t>/</a:t>
-            </a:r>
-            <a:r>
-              <a:rPr lang="en-US" i="1" dirty="0" smtClean="0">
-                <a:solidFill>
-                  <a:srgbClr val="0000FF"/>
-                </a:solidFill>
-                <a:latin typeface="Andale Mono"/>
-                <a:cs typeface="Andale Mono"/>
-              </a:rPr>
-              <a:t> </a:t>
-            </a:r>
-            <a:r>
-              <a:rPr lang="en-US" i="1" dirty="0" smtClean="0">
-                <a:solidFill>
-                  <a:srgbClr val="0000FF"/>
-                </a:solidFill>
-                <a:latin typeface="Andale Mono"/>
-                <a:cs typeface="Andale Mono"/>
-              </a:rPr>
-              <a:t>T</a:t>
-            </a:r>
-            <a:r>
-              <a:rPr lang="en-US" i="1" dirty="0" smtClean="0">
-                <a:solidFill>
-                  <a:srgbClr val="0000FF"/>
-                </a:solidFill>
-                <a:latin typeface="Andale Mono"/>
-                <a:cs typeface="Andale Mono"/>
-              </a:rPr>
-              <a:t>exture </a:t>
-            </a:r>
-            <a:r>
-              <a:rPr lang="en-US" i="1" dirty="0" smtClean="0">
-                <a:solidFill>
-                  <a:srgbClr val="0000FF"/>
-                </a:solidFill>
-                <a:latin typeface="Andale Mono"/>
-                <a:cs typeface="Andale Mono"/>
-              </a:rPr>
-              <a:t>must be defined within same file</a:t>
-            </a:r>
-            <a:endParaRPr lang="en-US" i="1" dirty="0" smtClean="0">
-              <a:solidFill>
-                <a:srgbClr val="0000FF"/>
-              </a:solidFill>
-              <a:latin typeface="Andale Mono"/>
-              <a:cs typeface="Andale Mono"/>
-            </a:endParaRPr>
-          </a:p>
-          <a:p>
-            <a:r>
-              <a:rPr lang="en-US" dirty="0" smtClean="0">
-                <a:solidFill>
-                  <a:schemeClr val="tx1"/>
-                </a:solidFill>
-                <a:latin typeface="Andale Mono"/>
-                <a:cs typeface="Andale Mono"/>
-              </a:rPr>
-              <a:t>t</a:t>
-            </a:r>
-            <a:r>
-              <a:rPr lang="en-US" dirty="0" smtClean="0">
-                <a:solidFill>
-                  <a:schemeClr val="tx1"/>
-                </a:solidFill>
-                <a:latin typeface="Andale Mono"/>
-                <a:cs typeface="Andale Mono"/>
-              </a:rPr>
-              <a:t>exture&lt;float2&gt; </a:t>
-            </a:r>
-            <a:r>
-              <a:rPr lang="en-US" dirty="0" err="1" smtClean="0">
-                <a:solidFill>
-                  <a:schemeClr val="tx1"/>
-                </a:solidFill>
-                <a:latin typeface="Andale Mono"/>
-                <a:cs typeface="Andale Mono"/>
-              </a:rPr>
-              <a:t>tex</a:t>
-            </a:r>
-            <a:r>
-              <a:rPr lang="en-US" dirty="0" smtClean="0">
-                <a:solidFill>
-                  <a:schemeClr val="tx1"/>
-                </a:solidFill>
-                <a:latin typeface="Andale Mono"/>
-                <a:cs typeface="Andale Mono"/>
-              </a:rPr>
-              <a:t>;</a:t>
-            </a:r>
-          </a:p>
-          <a:p>
-            <a:r>
-              <a:rPr lang="en-US" dirty="0" smtClean="0">
-                <a:solidFill>
-                  <a:schemeClr val="tx1"/>
-                </a:solidFill>
-                <a:latin typeface="Andale Mono"/>
-                <a:cs typeface="Andale Mono"/>
-              </a:rPr>
-              <a:t> </a:t>
-            </a:r>
-          </a:p>
-          <a:p>
-            <a:r>
-              <a:rPr lang="en-US" dirty="0" err="1" smtClean="0">
-                <a:solidFill>
-                  <a:schemeClr val="tx1"/>
-                </a:solidFill>
-                <a:latin typeface="Andale Mono"/>
-                <a:cs typeface="Andale Mono"/>
-              </a:rPr>
-              <a:t>UCL_Texture</a:t>
-            </a:r>
-            <a:r>
-              <a:rPr lang="en-US" dirty="0" smtClean="0">
-                <a:solidFill>
-                  <a:schemeClr val="tx1"/>
-                </a:solidFill>
-                <a:latin typeface="Andale Mono"/>
-                <a:cs typeface="Andale Mono"/>
-              </a:rPr>
-              <a:t> </a:t>
-            </a:r>
-            <a:r>
-              <a:rPr lang="en-US" dirty="0" err="1" smtClean="0">
-                <a:solidFill>
-                  <a:schemeClr val="tx1"/>
-                </a:solidFill>
-                <a:latin typeface="Andale Mono"/>
-                <a:cs typeface="Andale Mono"/>
-              </a:rPr>
-              <a:t>my_tex(tex</a:t>
-            </a:r>
-            <a:r>
-              <a:rPr lang="en-US" dirty="0" smtClean="0">
-                <a:solidFill>
-                  <a:schemeClr val="tx1"/>
-                </a:solidFill>
-                <a:latin typeface="Andale Mono"/>
-                <a:cs typeface="Andale Mono"/>
-              </a:rPr>
-              <a:t>);</a:t>
-            </a:r>
-          </a:p>
-          <a:p>
-            <a:r>
-              <a:rPr lang="en-US" i="1" dirty="0" smtClean="0">
-                <a:solidFill>
-                  <a:srgbClr val="0000FF"/>
-                </a:solidFill>
-                <a:latin typeface="Andale Mono"/>
-                <a:cs typeface="Andale Mono"/>
-              </a:rPr>
-              <a:t>//</a:t>
-            </a:r>
-            <a:r>
-              <a:rPr lang="en-US" i="1" dirty="0" smtClean="0">
-                <a:solidFill>
-                  <a:srgbClr val="0000FF"/>
-                </a:solidFill>
-                <a:latin typeface="Andale Mono"/>
-                <a:cs typeface="Andale Mono"/>
-              </a:rPr>
-              <a:t> -- or –</a:t>
+              <a:t>// -- or –</a:t>
             </a:r>
             <a:endParaRPr lang="en-US" dirty="0" smtClean="0">
               <a:solidFill>
@@ -22105,35 +21962,18 @@
                 <a:latin typeface="Andale Mono"/>
                 <a:cs typeface="Andale Mono"/>
               </a:rPr>
-              <a:t>m</a:t>
-            </a:r>
-            <a:r>
-              <a:rPr lang="en-US" dirty="0" err="1" smtClean="0">
+              <a:t>my_tex.get_texture(tex</a:t>
+            </a:r>
+            <a:r>
+              <a:rPr lang="en-US" dirty="0" smtClean="0">
                 <a:solidFill>
                   <a:schemeClr val="tx1"/>
                 </a:solidFill>
                 <a:latin typeface="Andale Mono"/>
                 <a:cs typeface="Andale Mono"/>
               </a:rPr>
-              <a:t>y_tex.get_texture(tex</a:t>
-            </a:r>
-            <a:r>
-              <a:rPr lang="en-US" dirty="0" smtClean="0">
-                <a:solidFill>
-                  <a:schemeClr val="tx1"/>
-                </a:solidFill>
-                <a:latin typeface="Andale Mono"/>
-                <a:cs typeface="Andale Mono"/>
-              </a:rPr>
               <a:t>);</a:t>
             </a:r>
-            <a:endParaRPr lang="en-US" dirty="0" smtClean="0">
-              <a:solidFill>
-                <a:schemeClr val="tx1"/>
-              </a:solidFill>
-              <a:latin typeface="Andale Mono"/>
-              <a:cs typeface="Andale Mono"/>
-            </a:endParaRPr>
           </a:p>
         </p:txBody>
       </p:sp>
@@ -22247,17 +22087,7 @@
                 <a:latin typeface="Andale Mono"/>
                 <a:cs typeface="Andale Mono"/>
               </a:rPr>
-              <a:t>m</a:t>
-            </a:r>
-            <a:r>
-              <a:rPr lang="en-US" dirty="0" smtClean="0">
-                <a:solidFill>
-                  <a:schemeClr val="tx1"/>
-                </a:solidFill>
-                <a:latin typeface="Andale Mono"/>
-                <a:cs typeface="Andale Mono"/>
-              </a:rPr>
-              <a:t>y_tex.bind_float(my_array.begin(),2);</a:t>
+              <a:t>my_tex.bind_float(my_array.begin(),2);</a:t>
             </a:r>
           </a:p>
           <a:p>
@@ -22278,17 +22108,7 @@
                 <a:latin typeface="Andale Mono"/>
                 <a:cs typeface="Andale Mono"/>
               </a:rPr>
-              <a:t>//</a:t>
-            </a:r>
-            <a:r>
-              <a:rPr lang="en-US" i="1" dirty="0" smtClean="0">
-                <a:solidFill>
-                  <a:srgbClr val="0000FF"/>
-                </a:solidFill>
-                <a:latin typeface="Andale Mono"/>
-                <a:cs typeface="Andale Mono"/>
-              </a:rPr>
-              <a:t> Texture is fetched within a kernel using</a:t>
+              <a:t>// Texture is fetched within a kernel using</a:t>
             </a:r>
           </a:p>
           <a:p>
@@ -22321,27 +22141,7 @@
                 <a:latin typeface="Andale Mono"/>
                 <a:cs typeface="Andale Mono"/>
               </a:rPr>
-              <a:t>/</a:t>
-            </a:r>
-            <a:r>
-              <a:rPr lang="en-US" i="1" dirty="0" smtClean="0">
-                <a:solidFill>
-                  <a:srgbClr val="0000FF"/>
-                </a:solidFill>
-                <a:latin typeface="Andale Mono"/>
-                <a:cs typeface="Andale Mono"/>
-              </a:rPr>
-              <a:t>/ To</a:t>
-            </a:r>
-            <a:r>
-              <a:rPr lang="en-US" i="1" dirty="0" smtClean="0">
-                <a:solidFill>
-                  <a:srgbClr val="0000FF"/>
-                </a:solidFill>
-                <a:latin typeface="Andale Mono"/>
-                <a:cs typeface="Andale Mono"/>
-              </a:rPr>
-              <a:t> unbind the array</a:t>
+              <a:t>// To unbind the array</a:t>
             </a:r>
             <a:endParaRPr lang="en-US" dirty="0" smtClean="0">
               <a:solidFill>
@@ -22370,17 +22170,7 @@
                 <a:latin typeface="Andale Mono"/>
                 <a:cs typeface="Andale Mono"/>
               </a:rPr>
-              <a:t>()</a:t>
-            </a:r>
-            <a:r>
-              <a:rPr lang="en-US" dirty="0" smtClean="0">
-                <a:solidFill>
-                  <a:schemeClr val="tx1"/>
-                </a:solidFill>
-                <a:latin typeface="Andale Mono"/>
-                <a:cs typeface="Andale Mono"/>
-              </a:rPr>
-              <a:t>;</a:t>
+              <a:t>();</a:t>
             </a:r>
           </a:p>
           <a:p>

</xml_diff>

<commit_message>
Geryon: Adding more error checking options to device set function.
</commit_message>
<xml_diff>
--- a/geryon.pptx
+++ b/geryon.pptx
@@ -66,12 +66,13 @@
     <p:sldId id="315" r:id="rId60"/>
     <p:sldId id="316" r:id="rId61"/>
     <p:sldId id="318" r:id="rId62"/>
-    <p:sldId id="323" r:id="rId63"/>
-    <p:sldId id="324" r:id="rId64"/>
-    <p:sldId id="325" r:id="rId65"/>
-    <p:sldId id="326" r:id="rId66"/>
-    <p:sldId id="296" r:id="rId67"/>
-    <p:sldId id="297" r:id="rId68"/>
+    <p:sldId id="329" r:id="rId63"/>
+    <p:sldId id="323" r:id="rId64"/>
+    <p:sldId id="324" r:id="rId65"/>
+    <p:sldId id="325" r:id="rId66"/>
+    <p:sldId id="326" r:id="rId67"/>
+    <p:sldId id="296" r:id="rId68"/>
+    <p:sldId id="297" r:id="rId69"/>
   </p:sldIdLst>
   <p:sldSz cx="9144000" cy="6858000" type="screen4x3"/>
   <p:notesSz cx="6858000" cy="9144000"/>
@@ -368,7 +369,7 @@
             <a:fld id="{9F85648D-267C-4F54-90B5-C36298A60516}" type="datetimeFigureOut">
               <a:rPr lang="en-US" smtClean="0"/>
               <a:pPr/>
-              <a:t>4/4/11</a:t>
+              <a:t>11/1/11</a:t>
             </a:fld>
             <a:endParaRPr lang="en-US"/>
           </a:p>
@@ -723,7 +724,7 @@
             <a:fld id="{B99FC8A4-244F-0044-8098-5FFBFA181F2A}" type="datetimeFigureOut">
               <a:rPr lang="en-US" smtClean="0"/>
               <a:pPr/>
-              <a:t>4/4/11</a:t>
+              <a:t>11/1/11</a:t>
             </a:fld>
             <a:endParaRPr lang="en-US"/>
           </a:p>
@@ -900,7 +901,7 @@
             <a:fld id="{B99FC8A4-244F-0044-8098-5FFBFA181F2A}" type="datetimeFigureOut">
               <a:rPr lang="en-US" smtClean="0"/>
               <a:pPr/>
-              <a:t>4/4/11</a:t>
+              <a:t>11/1/11</a:t>
             </a:fld>
             <a:endParaRPr lang="en-US"/>
           </a:p>
@@ -1015,7 +1016,7 @@
             <a:fld id="{B99FC8A4-244F-0044-8098-5FFBFA181F2A}" type="datetimeFigureOut">
               <a:rPr lang="en-US" smtClean="0"/>
               <a:pPr/>
-              <a:t>4/4/11</a:t>
+              <a:t>11/1/11</a:t>
             </a:fld>
             <a:endParaRPr lang="en-US"/>
           </a:p>
@@ -1375,7 +1376,7 @@
             <a:fld id="{74CBEAF9-9E58-4CC8-A6FF-6DD8A58DEEA4}" type="datetimeFigureOut">
               <a:rPr lang="en-US" smtClean="0"/>
               <a:pPr/>
-              <a:t>4/4/11</a:t>
+              <a:t>11/1/11</a:t>
             </a:fld>
             <a:endParaRPr lang="en-US"/>
           </a:p>
@@ -1642,7 +1643,7 @@
             <a:fld id="{B99FC8A4-244F-0044-8098-5FFBFA181F2A}" type="datetimeFigureOut">
               <a:rPr lang="en-US" smtClean="0"/>
               <a:pPr/>
-              <a:t>4/4/11</a:t>
+              <a:t>11/1/11</a:t>
             </a:fld>
             <a:endParaRPr lang="en-US"/>
           </a:p>
@@ -2006,7 +2007,7 @@
             <a:fld id="{B99FC8A4-244F-0044-8098-5FFBFA181F2A}" type="datetimeFigureOut">
               <a:rPr lang="en-US" smtClean="0"/>
               <a:pPr/>
-              <a:t>4/4/11</a:t>
+              <a:t>11/1/11</a:t>
             </a:fld>
             <a:endParaRPr lang="en-US"/>
           </a:p>
@@ -2235,7 +2236,7 @@
             <a:fld id="{B99FC8A4-244F-0044-8098-5FFBFA181F2A}" type="datetimeFigureOut">
               <a:rPr lang="en-US" smtClean="0"/>
               <a:pPr/>
-              <a:t>4/4/11</a:t>
+              <a:t>11/1/11</a:t>
             </a:fld>
             <a:endParaRPr lang="en-US"/>
           </a:p>
@@ -2327,7 +2328,7 @@
             <a:fld id="{B99FC8A4-244F-0044-8098-5FFBFA181F2A}" type="datetimeFigureOut">
               <a:rPr lang="en-US" smtClean="0"/>
               <a:pPr/>
-              <a:t>4/4/11</a:t>
+              <a:t>11/1/11</a:t>
             </a:fld>
             <a:endParaRPr lang="en-US"/>
           </a:p>
@@ -2596,7 +2597,7 @@
             <a:fld id="{B99FC8A4-244F-0044-8098-5FFBFA181F2A}" type="datetimeFigureOut">
               <a:rPr lang="en-US" smtClean="0"/>
               <a:pPr/>
-              <a:t>4/4/11</a:t>
+              <a:t>11/1/11</a:t>
             </a:fld>
             <a:endParaRPr lang="en-US"/>
           </a:p>
@@ -2826,7 +2827,7 @@
             <a:fld id="{B99FC8A4-244F-0044-8098-5FFBFA181F2A}" type="datetimeFigureOut">
               <a:rPr lang="en-US" smtClean="0"/>
               <a:pPr/>
-              <a:t>4/4/11</a:t>
+              <a:t>11/1/11</a:t>
             </a:fld>
             <a:endParaRPr lang="en-US"/>
           </a:p>
@@ -3327,7 +3328,7 @@
             <a:fld id="{B99FC8A4-244F-0044-8098-5FFBFA181F2A}" type="datetimeFigureOut">
               <a:rPr lang="en-US" smtClean="0"/>
               <a:pPr/>
-              <a:t>4/4/11</a:t>
+              <a:t>11/1/11</a:t>
             </a:fld>
             <a:endParaRPr lang="en-US"/>
           </a:p>
@@ -3835,7 +3836,7 @@
             <a:fld id="{B78C6173-A124-044B-A6DC-2740D4C46ECF}" type="datetime1">
               <a:rPr lang="en-US" sz="1200" i="0" smtClean="0"/>
               <a:pPr algn="r"/>
-              <a:t>4/4/11</a:t>
+              <a:t>11/1/11</a:t>
             </a:fld>
             <a:endParaRPr lang="en-US" sz="1200" dirty="0"/>
           </a:p>
@@ -5112,14 +5113,7 @@
                 <a:latin typeface="Andale Mono"/>
                 <a:cs typeface="Andale Mono"/>
               </a:rPr>
-              <a:t>ucl_sync(dev.cq(1))</a:t>
-            </a:r>
-            <a:r>
-              <a:rPr lang="en-US" dirty="0" smtClean="0">
-                <a:latin typeface="Andale Mono"/>
-                <a:cs typeface="Andale Mono"/>
-              </a:rPr>
-              <a:t>;</a:t>
+              <a:t>ucl_sync(dev.cq(1));</a:t>
             </a:r>
           </a:p>
           <a:p>
@@ -13652,11 +13646,7 @@
           <a:p>
             <a:r>
               <a:rPr lang="en-US" dirty="0" smtClean="0"/>
-              <a:t>Device </a:t>
-            </a:r>
-            <a:r>
-              <a:rPr lang="en-US" dirty="0" smtClean="0"/>
-              <a:t>Timing and Advanced Synchronization</a:t>
+              <a:t>Device Timing and Advanced Synchronization</a:t>
             </a:r>
             <a:endParaRPr lang="en-US" dirty="0"/>
           </a:p>
@@ -14524,13 +14514,6 @@
               </a:rPr>
               <a:t>);</a:t>
             </a:r>
-            <a:endParaRPr lang="en-US" dirty="0" smtClean="0">
-              <a:solidFill>
-                <a:srgbClr val="000000"/>
-              </a:solidFill>
-              <a:latin typeface="Andale Mono"/>
-              <a:cs typeface="Andale Mono"/>
-            </a:endParaRPr>
           </a:p>
           <a:p>
             <a:endParaRPr lang="en-US" i="1" dirty="0">
@@ -14550,17 +14533,7 @@
                 <a:latin typeface="Andale Mono"/>
                 <a:cs typeface="Andale Mono"/>
               </a:rPr>
-              <a:t>// </a:t>
-            </a:r>
-            <a:r>
-              <a:rPr lang="en-US" i="1" dirty="0" smtClean="0">
-                <a:solidFill>
-                  <a:srgbClr val="0000FF"/>
-                </a:solidFill>
-                <a:latin typeface="Andale Mono"/>
-                <a:cs typeface="Andale Mono"/>
-              </a:rPr>
-              <a:t>To synchronize by blocking to a specific point in</a:t>
+              <a:t>// To synchronize by blocking to a specific point in</a:t>
             </a:r>
           </a:p>
           <a:p>
@@ -14744,6 +14717,60 @@
                 <a:latin typeface="Andale Mono"/>
                 <a:cs typeface="Andale Mono"/>
               </a:rPr>
+              <a:t>// To block on </a:t>
+            </a:r>
+            <a:r>
+              <a:rPr lang="en-US" i="1" dirty="0" err="1" smtClean="0">
+                <a:solidFill>
+                  <a:srgbClr val="0000FF"/>
+                </a:solidFill>
+                <a:latin typeface="Andale Mono"/>
+                <a:cs typeface="Andale Mono"/>
+              </a:rPr>
+              <a:t>cpu</a:t>
+            </a:r>
+            <a:r>
+              <a:rPr lang="en-US" i="1" dirty="0" smtClean="0">
+                <a:solidFill>
+                  <a:srgbClr val="0000FF"/>
+                </a:solidFill>
+                <a:latin typeface="Andale Mono"/>
+                <a:cs typeface="Andale Mono"/>
+              </a:rPr>
+              <a:t> until the first copy has finished:</a:t>
+            </a:r>
+          </a:p>
+          <a:p>
+            <a:r>
+              <a:rPr lang="en-US" dirty="0" err="1" smtClean="0">
+                <a:solidFill>
+                  <a:srgbClr val="000000"/>
+                </a:solidFill>
+                <a:latin typeface="Andale Mono"/>
+                <a:cs typeface="Andale Mono"/>
+              </a:rPr>
+              <a:t>timer_a.sync_stop</a:t>
+            </a:r>
+            <a:r>
+              <a:rPr lang="en-US" dirty="0" smtClean="0">
+                <a:solidFill>
+                  <a:srgbClr val="000000"/>
+                </a:solidFill>
+                <a:latin typeface="Andale Mono"/>
+                <a:cs typeface="Andale Mono"/>
+              </a:rPr>
+              <a:t>();</a:t>
+            </a:r>
+          </a:p>
+          <a:p>
+            <a:r>
+              <a:rPr lang="en-US" i="1" dirty="0">
+                <a:solidFill>
+                  <a:srgbClr val="0000FF"/>
+                </a:solidFill>
+                <a:latin typeface="Andale Mono"/>
+                <a:cs typeface="Andale Mono"/>
+              </a:rPr>
               <a:t>/</a:t>
             </a:r>
             <a:r>
@@ -14754,37 +14781,17 @@
                 <a:latin typeface="Andale Mono"/>
                 <a:cs typeface="Andale Mono"/>
               </a:rPr>
-              <a:t>/ </a:t>
-            </a:r>
-            <a:r>
-              <a:rPr lang="en-US" i="1" dirty="0" smtClean="0">
-                <a:solidFill>
-                  <a:srgbClr val="0000FF"/>
-                </a:solidFill>
-                <a:latin typeface="Andale Mono"/>
-                <a:cs typeface="Andale Mono"/>
-              </a:rPr>
-              <a:t>To block on </a:t>
-            </a:r>
-            <a:r>
-              <a:rPr lang="en-US" i="1" dirty="0" err="1" smtClean="0">
-                <a:solidFill>
-                  <a:srgbClr val="0000FF"/>
-                </a:solidFill>
-                <a:latin typeface="Andale Mono"/>
-                <a:cs typeface="Andale Mono"/>
-              </a:rPr>
-              <a:t>cpu</a:t>
-            </a:r>
-            <a:r>
-              <a:rPr lang="en-US" i="1" dirty="0" smtClean="0">
-                <a:solidFill>
-                  <a:srgbClr val="0000FF"/>
-                </a:solidFill>
-                <a:latin typeface="Andale Mono"/>
-                <a:cs typeface="Andale Mono"/>
-              </a:rPr>
-              <a:t> until the first copy has finished:</a:t>
+              <a:t>/     -</a:t>
+            </a:r>
+            <a:r>
+              <a:rPr lang="en-US" i="1" dirty="0">
+                <a:solidFill>
+                  <a:srgbClr val="0000FF"/>
+                </a:solidFill>
+                <a:latin typeface="Andale Mono"/>
+                <a:cs typeface="Andale Mono"/>
+              </a:rPr>
+              <a:t>-- or --- </a:t>
             </a:r>
           </a:p>
           <a:p>
@@ -14796,7 +14803,7 @@
                 <a:latin typeface="Andale Mono"/>
                 <a:cs typeface="Andale Mono"/>
               </a:rPr>
-              <a:t>timer_a.sync_stop</a:t>
+              <a:t>timer_b.sync_start</a:t>
             </a:r>
             <a:r>
               <a:rPr lang="en-US" dirty="0" smtClean="0">
@@ -14808,67 +14815,6 @@
               </a:rPr>
               <a:t>();</a:t>
             </a:r>
-          </a:p>
-          <a:p>
-            <a:r>
-              <a:rPr lang="en-US" i="1" dirty="0">
-                <a:solidFill>
-                  <a:srgbClr val="0000FF"/>
-                </a:solidFill>
-                <a:latin typeface="Andale Mono"/>
-                <a:cs typeface="Andale Mono"/>
-              </a:rPr>
-              <a:t>/</a:t>
-            </a:r>
-            <a:r>
-              <a:rPr lang="en-US" i="1" dirty="0" smtClean="0">
-                <a:solidFill>
-                  <a:srgbClr val="0000FF"/>
-                </a:solidFill>
-                <a:latin typeface="Andale Mono"/>
-                <a:cs typeface="Andale Mono"/>
-              </a:rPr>
-              <a:t>/     -</a:t>
-            </a:r>
-            <a:r>
-              <a:rPr lang="en-US" i="1" dirty="0">
-                <a:solidFill>
-                  <a:srgbClr val="0000FF"/>
-                </a:solidFill>
-                <a:latin typeface="Andale Mono"/>
-                <a:cs typeface="Andale Mono"/>
-              </a:rPr>
-              <a:t>-- or --- </a:t>
-            </a:r>
-          </a:p>
-          <a:p>
-            <a:r>
-              <a:rPr lang="en-US" dirty="0" err="1" smtClean="0">
-                <a:solidFill>
-                  <a:srgbClr val="000000"/>
-                </a:solidFill>
-                <a:latin typeface="Andale Mono"/>
-                <a:cs typeface="Andale Mono"/>
-              </a:rPr>
-              <a:t>timer_b.sync_start</a:t>
-            </a:r>
-            <a:r>
-              <a:rPr lang="en-US" dirty="0" smtClean="0">
-                <a:solidFill>
-                  <a:srgbClr val="000000"/>
-                </a:solidFill>
-                <a:latin typeface="Andale Mono"/>
-                <a:cs typeface="Andale Mono"/>
-              </a:rPr>
-              <a:t>();</a:t>
-            </a:r>
-            <a:endParaRPr lang="en-US" dirty="0" smtClean="0">
-              <a:solidFill>
-                <a:srgbClr val="000000"/>
-              </a:solidFill>
-              <a:latin typeface="Andale Mono"/>
-              <a:cs typeface="Andale Mono"/>
-            </a:endParaRPr>
           </a:p>
         </p:txBody>
       </p:sp>
@@ -16974,17 +16920,7 @@
                 <a:latin typeface="Andale Mono"/>
                 <a:cs typeface="Andale Mono"/>
               </a:rPr>
-              <a:t>// --- or --- add up to </a:t>
-            </a:r>
-            <a:r>
-              <a:rPr lang="en-US" i="1" dirty="0" smtClean="0">
-                <a:solidFill>
-                  <a:srgbClr val="0000FF"/>
-                </a:solidFill>
-                <a:latin typeface="Andale Mono"/>
-                <a:cs typeface="Andale Mono"/>
-              </a:rPr>
-              <a:t>30 </a:t>
+              <a:t>// --- or --- add up to 30 </a:t>
             </a:r>
             <a:r>
               <a:rPr lang="en-US" i="1" dirty="0" err="1" smtClean="0">
@@ -20431,7 +20367,15 @@
           <a:p>
             <a:r>
               <a:rPr lang="en-US" dirty="0" smtClean="0"/>
-              <a:t>The current exceptions are kernel compilation and memory allocation</a:t>
+              <a:t>The current exceptions are </a:t>
+            </a:r>
+            <a:r>
+              <a:rPr lang="en-US" dirty="0" smtClean="0"/>
+              <a:t>device initialization, kernel </a:t>
+            </a:r>
+            <a:r>
+              <a:rPr lang="en-US" dirty="0" smtClean="0"/>
+              <a:t>compilation and memory allocation</a:t>
             </a:r>
           </a:p>
           <a:p>
@@ -20736,7 +20680,7 @@
         </p:spPr>
         <p:txBody>
           <a:bodyPr>
-            <a:normAutofit fontScale="92500" lnSpcReduction="10000"/>
+            <a:normAutofit fontScale="92500" lnSpcReduction="20000"/>
           </a:bodyPr>
           <a:lstStyle/>
           <a:p>
@@ -20795,7 +20739,15 @@
             </a:r>
             <a:r>
               <a:rPr lang="en-US" dirty="0" smtClean="0"/>
-              <a:t> when an error occurs in kernel compilation or memory allocation</a:t>
+              <a:t> when an error occurs in </a:t>
+            </a:r>
+            <a:r>
+              <a:rPr lang="en-US" dirty="0" smtClean="0"/>
+              <a:t>device initialization, kernel compilation, </a:t>
+            </a:r>
+            <a:r>
+              <a:rPr lang="en-US" dirty="0" smtClean="0"/>
+              <a:t>or memory allocation</a:t>
             </a:r>
           </a:p>
           <a:p>
@@ -20921,8 +20873,8 @@
         </p:nvSpPr>
         <p:spPr>
           <a:xfrm>
-            <a:off x="498159" y="276890"/>
-            <a:ext cx="8292943" cy="6186310"/>
+            <a:off x="498159" y="1409020"/>
+            <a:ext cx="8292943" cy="3970318"/>
           </a:xfrm>
           <a:prstGeom prst="rect">
             <a:avLst/>
@@ -20949,6 +20901,16 @@
           <a:lstStyle/>
           <a:p>
             <a:r>
+              <a:rPr lang="en-US" i="1" dirty="0">
+                <a:solidFill>
+                  <a:srgbClr val="0000FF"/>
+                </a:solidFill>
+                <a:latin typeface="Andale Mono"/>
+                <a:cs typeface="Andale Mono"/>
+              </a:rPr>
+              <a:t>// To check for </a:t>
+            </a:r>
+            <a:r>
               <a:rPr lang="en-US" i="1" dirty="0" smtClean="0">
                 <a:solidFill>
                   <a:srgbClr val="0000FF"/>
@@ -20956,10 +20918,30 @@
                 <a:latin typeface="Andale Mono"/>
                 <a:cs typeface="Andale Mono"/>
               </a:rPr>
-              <a:t>// To check for memory allocation errors</a:t>
-            </a:r>
-          </a:p>
-          <a:p>
+              <a:t>device initialization </a:t>
+            </a:r>
+            <a:r>
+              <a:rPr lang="en-US" i="1" dirty="0">
+                <a:solidFill>
+                  <a:srgbClr val="0000FF"/>
+                </a:solidFill>
+                <a:latin typeface="Andale Mono"/>
+                <a:cs typeface="Andale Mono"/>
+              </a:rPr>
+              <a:t>errors</a:t>
+            </a:r>
+          </a:p>
+          <a:p>
+            <a:r>
+              <a:rPr lang="en-US" i="1" dirty="0">
+                <a:solidFill>
+                  <a:srgbClr val="0000FF"/>
+                </a:solidFill>
+                <a:latin typeface="Andale Mono"/>
+                <a:cs typeface="Andale Mono"/>
+              </a:rPr>
+              <a:t>// -- Define UCL_NO_EXIT preprocessor </a:t>
+            </a:r>
             <a:r>
               <a:rPr lang="en-US" i="1" dirty="0" smtClean="0">
                 <a:solidFill>
@@ -20968,121 +20950,11 @@
                 <a:latin typeface="Andale Mono"/>
                 <a:cs typeface="Andale Mono"/>
               </a:rPr>
-              <a:t>// -- Define UCL_NO_EXIT preprocessor directive</a:t>
-            </a:r>
-          </a:p>
-          <a:p>
-            <a:r>
-              <a:rPr lang="en-US" dirty="0" smtClean="0">
-                <a:solidFill>
-                  <a:schemeClr val="tx1"/>
-                </a:solidFill>
-                <a:latin typeface="Andale Mono"/>
-                <a:cs typeface="Andale Mono"/>
-              </a:rPr>
-              <a:t>if (d_mat.alloc(6,dev)!=UCL_SUCCESS) {</a:t>
-            </a:r>
-          </a:p>
-          <a:p>
-            <a:r>
-              <a:rPr lang="en-US" dirty="0" smtClean="0">
-                <a:solidFill>
-                  <a:schemeClr val="tx1"/>
-                </a:solidFill>
-                <a:latin typeface="Andale Mono"/>
-                <a:cs typeface="Andale Mono"/>
-              </a:rPr>
-              <a:t>  </a:t>
-            </a:r>
-            <a:r>
-              <a:rPr lang="en-US" dirty="0" err="1" smtClean="0">
-                <a:solidFill>
-                  <a:schemeClr val="tx1"/>
-                </a:solidFill>
-                <a:latin typeface="Andale Mono"/>
-                <a:cs typeface="Andale Mono"/>
-              </a:rPr>
-              <a:t>cerr</a:t>
-            </a:r>
-            <a:r>
-              <a:rPr lang="en-US" dirty="0" smtClean="0">
-                <a:solidFill>
-                  <a:schemeClr val="tx1"/>
-                </a:solidFill>
-                <a:latin typeface="Andale Mono"/>
-                <a:cs typeface="Andale Mono"/>
-              </a:rPr>
-              <a:t> &lt;&lt; “Could not allocate 6 elements on device “</a:t>
-            </a:r>
-          </a:p>
-          <a:p>
-            <a:r>
-              <a:rPr lang="en-US" dirty="0" smtClean="0">
-                <a:solidFill>
-                  <a:schemeClr val="tx1"/>
-                </a:solidFill>
-                <a:latin typeface="Andale Mono"/>
-                <a:cs typeface="Andale Mono"/>
-              </a:rPr>
-              <a:t>       &lt;&lt; </a:t>
-            </a:r>
-            <a:r>
-              <a:rPr lang="en-US" dirty="0" err="1" smtClean="0">
-                <a:solidFill>
-                  <a:schemeClr val="tx1"/>
-                </a:solidFill>
-                <a:latin typeface="Andale Mono"/>
-                <a:cs typeface="Andale Mono"/>
-              </a:rPr>
-              <a:t>dev.name</a:t>
-            </a:r>
-            <a:r>
-              <a:rPr lang="en-US" dirty="0" smtClean="0">
-                <a:solidFill>
-                  <a:schemeClr val="tx1"/>
-                </a:solidFill>
-                <a:latin typeface="Andale Mono"/>
-                <a:cs typeface="Andale Mono"/>
-              </a:rPr>
-              <a:t>() &lt;&lt; </a:t>
-            </a:r>
-            <a:r>
-              <a:rPr lang="en-US" dirty="0" err="1" smtClean="0">
-                <a:solidFill>
-                  <a:schemeClr val="tx1"/>
-                </a:solidFill>
-                <a:latin typeface="Andale Mono"/>
-                <a:cs typeface="Andale Mono"/>
-              </a:rPr>
-              <a:t>endl</a:t>
-            </a:r>
-            <a:r>
-              <a:rPr lang="en-US" dirty="0" smtClean="0">
-                <a:solidFill>
-                  <a:schemeClr val="tx1"/>
-                </a:solidFill>
-                <a:latin typeface="Andale Mono"/>
-                <a:cs typeface="Andale Mono"/>
-              </a:rPr>
-              <a:t>;</a:t>
-            </a:r>
-          </a:p>
-          <a:p>
-            <a:r>
-              <a:rPr lang="en-US" dirty="0" smtClean="0">
-                <a:solidFill>
-                  <a:schemeClr val="tx1"/>
-                </a:solidFill>
-                <a:latin typeface="Andale Mono"/>
-                <a:cs typeface="Andale Mono"/>
-              </a:rPr>
-              <a:t>}</a:t>
-            </a:r>
-          </a:p>
-          <a:p>
-            <a:endParaRPr lang="en-US" dirty="0" smtClean="0">
+              <a:t>directive</a:t>
+            </a:r>
+            <a:endParaRPr lang="en-US" i="1" dirty="0" smtClean="0">
               <a:solidFill>
-                <a:schemeClr val="tx1"/>
+                <a:srgbClr val="0000FF"/>
               </a:solidFill>
               <a:latin typeface="Andale Mono"/>
               <a:cs typeface="Andale Mono"/>
@@ -21090,15 +20962,121 @@
           </a:p>
           <a:p>
             <a:r>
+              <a:rPr lang="en-US" dirty="0" smtClean="0">
+                <a:solidFill>
+                  <a:srgbClr val="000000"/>
+                </a:solidFill>
+                <a:latin typeface="Andale Mono"/>
+                <a:cs typeface="Andale Mono"/>
+              </a:rPr>
+              <a:t>if (</a:t>
+            </a:r>
+            <a:r>
+              <a:rPr lang="en-US" dirty="0" err="1" smtClean="0">
+                <a:solidFill>
+                  <a:srgbClr val="000000"/>
+                </a:solidFill>
+                <a:latin typeface="Andale Mono"/>
+                <a:cs typeface="Andale Mono"/>
+              </a:rPr>
+              <a:t>dev.set</a:t>
+            </a:r>
+            <a:r>
+              <a:rPr lang="en-US" dirty="0">
+                <a:solidFill>
+                  <a:srgbClr val="000000"/>
+                </a:solidFill>
+                <a:latin typeface="Andale Mono"/>
+                <a:cs typeface="Andale Mono"/>
+              </a:rPr>
+              <a:t>(0</a:t>
+            </a:r>
+            <a:r>
+              <a:rPr lang="en-US" dirty="0" smtClean="0">
+                <a:solidFill>
+                  <a:srgbClr val="000000"/>
+                </a:solidFill>
+                <a:latin typeface="Andale Mono"/>
+                <a:cs typeface="Andale Mono"/>
+              </a:rPr>
+              <a:t>)!=UCL_SUCCESS)</a:t>
+            </a:r>
+          </a:p>
+          <a:p>
+            <a:r>
+              <a:rPr lang="en-US" i="1" dirty="0">
+                <a:solidFill>
+                  <a:srgbClr val="000000"/>
+                </a:solidFill>
+                <a:latin typeface="Andale Mono"/>
+                <a:cs typeface="Andale Mono"/>
+              </a:rPr>
+              <a:t> </a:t>
+            </a:r>
+            <a:r>
               <a:rPr lang="en-US" i="1" dirty="0" smtClean="0">
                 <a:solidFill>
-                  <a:srgbClr val="0000FF"/>
-                </a:solidFill>
-                <a:latin typeface="Andale Mono"/>
-                <a:cs typeface="Andale Mono"/>
-              </a:rPr>
-              <a:t>// To check for compiling errors</a:t>
-            </a:r>
+                  <a:srgbClr val="000000"/>
+                </a:solidFill>
+                <a:latin typeface="Andale Mono"/>
+                <a:cs typeface="Andale Mono"/>
+              </a:rPr>
+              <a:t> </a:t>
+            </a:r>
+            <a:r>
+              <a:rPr lang="en-US" dirty="0" err="1" smtClean="0">
+                <a:solidFill>
+                  <a:srgbClr val="000000"/>
+                </a:solidFill>
+                <a:latin typeface="Andale Mono"/>
+                <a:cs typeface="Andale Mono"/>
+              </a:rPr>
+              <a:t>cerr</a:t>
+            </a:r>
+            <a:r>
+              <a:rPr lang="en-US" dirty="0" smtClean="0">
+                <a:solidFill>
+                  <a:srgbClr val="000000"/>
+                </a:solidFill>
+                <a:latin typeface="Andale Mono"/>
+                <a:cs typeface="Andale Mono"/>
+              </a:rPr>
+              <a:t> &lt;&lt; “Could not initialize device for use by program.”</a:t>
+            </a:r>
+            <a:endParaRPr lang="en-US" i="1" dirty="0">
+              <a:solidFill>
+                <a:srgbClr val="0000FF"/>
+              </a:solidFill>
+              <a:latin typeface="Andale Mono"/>
+              <a:cs typeface="Andale Mono"/>
+            </a:endParaRPr>
+          </a:p>
+          <a:p>
+            <a:endParaRPr lang="en-US" i="1" dirty="0" smtClean="0">
+              <a:solidFill>
+                <a:srgbClr val="0000FF"/>
+              </a:solidFill>
+              <a:latin typeface="Andale Mono"/>
+              <a:cs typeface="Andale Mono"/>
+            </a:endParaRPr>
+          </a:p>
+          <a:p>
+            <a:endParaRPr lang="en-US" i="1" dirty="0">
+              <a:solidFill>
+                <a:srgbClr val="0000FF"/>
+              </a:solidFill>
+              <a:latin typeface="Andale Mono"/>
+              <a:cs typeface="Andale Mono"/>
+            </a:endParaRPr>
+          </a:p>
+          <a:p>
+            <a:endParaRPr lang="en-US" i="1" dirty="0" smtClean="0">
+              <a:solidFill>
+                <a:srgbClr val="0000FF"/>
+              </a:solidFill>
+              <a:latin typeface="Andale Mono"/>
+              <a:cs typeface="Andale Mono"/>
+            </a:endParaRPr>
           </a:p>
           <a:p>
             <a:r>
@@ -21109,6 +21087,28 @@
                 <a:latin typeface="Andale Mono"/>
                 <a:cs typeface="Andale Mono"/>
               </a:rPr>
+              <a:t>/</a:t>
+            </a:r>
+            <a:r>
+              <a:rPr lang="en-US" i="1" dirty="0" smtClean="0">
+                <a:solidFill>
+                  <a:srgbClr val="0000FF"/>
+                </a:solidFill>
+                <a:latin typeface="Andale Mono"/>
+                <a:cs typeface="Andale Mono"/>
+              </a:rPr>
+              <a:t>/ To check for memory allocation errors</a:t>
+            </a:r>
+          </a:p>
+          <a:p>
+            <a:r>
+              <a:rPr lang="en-US" i="1" dirty="0" smtClean="0">
+                <a:solidFill>
+                  <a:srgbClr val="0000FF"/>
+                </a:solidFill>
+                <a:latin typeface="Andale Mono"/>
+                <a:cs typeface="Andale Mono"/>
+              </a:rPr>
               <a:t>// -- Define UCL_NO_EXIT preprocessor directive</a:t>
             </a:r>
           </a:p>
@@ -21121,10 +21121,20 @@
                 <a:latin typeface="Andale Mono"/>
                 <a:cs typeface="Andale Mono"/>
               </a:rPr>
-              <a:t>string clog;</a:t>
-            </a:r>
-          </a:p>
-          <a:p>
+              <a:t>if (d_mat.alloc(6,dev)!=UCL_SUCCESS) {</a:t>
+            </a:r>
+          </a:p>
+          <a:p>
+            <a:r>
+              <a:rPr lang="en-US" dirty="0" smtClean="0">
+                <a:solidFill>
+                  <a:schemeClr val="tx1"/>
+                </a:solidFill>
+                <a:latin typeface="Andale Mono"/>
+                <a:cs typeface="Andale Mono"/>
+              </a:rPr>
+              <a:t>  </a:t>
+            </a:r>
             <a:r>
               <a:rPr lang="en-US" dirty="0" err="1" smtClean="0">
                 <a:solidFill>
@@ -21133,7 +21143,7 @@
                 <a:latin typeface="Andale Mono"/>
                 <a:cs typeface="Andale Mono"/>
               </a:rPr>
-              <a:t>int</a:t>
+              <a:t>cerr</a:t>
             </a:r>
             <a:r>
               <a:rPr lang="en-US" dirty="0" smtClean="0">
@@ -21143,7 +21153,19 @@
                 <a:latin typeface="Andale Mono"/>
                 <a:cs typeface="Andale Mono"/>
               </a:rPr>
-              <a:t> err=</a:t>
+              <a:t> &lt;&lt; “Could not allocate 6 elements on device “</a:t>
+            </a:r>
+          </a:p>
+          <a:p>
+            <a:r>
+              <a:rPr lang="en-US" dirty="0" smtClean="0">
+                <a:solidFill>
+                  <a:schemeClr val="tx1"/>
+                </a:solidFill>
+                <a:latin typeface="Andale Mono"/>
+                <a:cs typeface="Andale Mono"/>
+              </a:rPr>
+              <a:t>       &lt;&lt; </a:t>
             </a:r>
             <a:r>
               <a:rPr lang="en-US" dirty="0" err="1" smtClean="0">
@@ -21153,7 +21175,7 @@
                 <a:latin typeface="Andale Mono"/>
                 <a:cs typeface="Andale Mono"/>
               </a:rPr>
-              <a:t>program.load(“test.ocl”,””,&amp;clog</a:t>
+              <a:t>dev.name</a:t>
             </a:r>
             <a:r>
               <a:rPr lang="en-US" dirty="0" smtClean="0">
@@ -21163,22 +21185,18 @@
                 <a:latin typeface="Andale Mono"/>
                 <a:cs typeface="Andale Mono"/>
               </a:rPr>
-              <a:t>);</a:t>
-            </a:r>
-          </a:p>
-          <a:p>
-            <a:r>
-              <a:rPr lang="en-US" dirty="0" smtClean="0">
+              <a:t>() &lt;&lt; </a:t>
+            </a:r>
+            <a:r>
+              <a:rPr lang="en-US" dirty="0" err="1" smtClean="0">
                 <a:solidFill>
                   <a:schemeClr val="tx1"/>
                 </a:solidFill>
                 <a:latin typeface="Andale Mono"/>
                 <a:cs typeface="Andale Mono"/>
               </a:rPr>
-              <a:t>if (err!=UCL_SUCCESS) {</a:t>
-            </a:r>
-          </a:p>
-          <a:p>
+              <a:t>endl</a:t>
+            </a:r>
             <a:r>
               <a:rPr lang="en-US" dirty="0" smtClean="0">
                 <a:solidFill>
@@ -21187,7 +21205,7 @@
                 <a:latin typeface="Andale Mono"/>
                 <a:cs typeface="Andale Mono"/>
               </a:rPr>
-              <a:t>  if (err==UCL_FILE_NOT_FOUND)</a:t>
+              <a:t>;</a:t>
             </a:r>
           </a:p>
           <a:p>
@@ -21199,271 +21217,7 @@
                 <a:latin typeface="Andale Mono"/>
                 <a:cs typeface="Andale Mono"/>
               </a:rPr>
-              <a:t>    </a:t>
-            </a:r>
-            <a:r>
-              <a:rPr lang="en-US" dirty="0" err="1" smtClean="0">
-                <a:solidFill>
-                  <a:schemeClr val="tx1"/>
-                </a:solidFill>
-                <a:latin typeface="Andale Mono"/>
-                <a:cs typeface="Andale Mono"/>
-              </a:rPr>
-              <a:t>cerr</a:t>
-            </a:r>
-            <a:r>
-              <a:rPr lang="en-US" dirty="0" smtClean="0">
-                <a:solidFill>
-                  <a:schemeClr val="tx1"/>
-                </a:solidFill>
-                <a:latin typeface="Andale Mono"/>
-                <a:cs typeface="Andale Mono"/>
-              </a:rPr>
-              <a:t> &lt;&lt; “Could not find </a:t>
-            </a:r>
-            <a:r>
-              <a:rPr lang="en-US" dirty="0" err="1" smtClean="0">
-                <a:solidFill>
-                  <a:schemeClr val="tx1"/>
-                </a:solidFill>
-                <a:latin typeface="Andale Mono"/>
-                <a:cs typeface="Andale Mono"/>
-              </a:rPr>
-              <a:t>test.ocl\n</a:t>
-            </a:r>
-            <a:r>
-              <a:rPr lang="en-US" dirty="0" smtClean="0">
-                <a:solidFill>
-                  <a:schemeClr val="tx1"/>
-                </a:solidFill>
-                <a:latin typeface="Andale Mono"/>
-                <a:cs typeface="Andale Mono"/>
-              </a:rPr>
-              <a:t>”;</a:t>
-            </a:r>
-          </a:p>
-          <a:p>
-            <a:r>
-              <a:rPr lang="en-US" dirty="0" smtClean="0">
-                <a:solidFill>
-                  <a:schemeClr val="tx1"/>
-                </a:solidFill>
-                <a:latin typeface="Andale Mono"/>
-                <a:cs typeface="Andale Mono"/>
-              </a:rPr>
-              <a:t>  if (err==UCL_COMPILE_ERROR)</a:t>
-            </a:r>
-          </a:p>
-          <a:p>
-            <a:r>
-              <a:rPr lang="en-US" dirty="0" smtClean="0">
-                <a:solidFill>
-                  <a:schemeClr val="tx1"/>
-                </a:solidFill>
-                <a:latin typeface="Andale Mono"/>
-                <a:cs typeface="Andale Mono"/>
-              </a:rPr>
-              <a:t>    </a:t>
-            </a:r>
-            <a:r>
-              <a:rPr lang="en-US" dirty="0" err="1" smtClean="0">
-                <a:solidFill>
-                  <a:schemeClr val="tx1"/>
-                </a:solidFill>
-                <a:latin typeface="Andale Mono"/>
-                <a:cs typeface="Andale Mono"/>
-              </a:rPr>
-              <a:t>cerr</a:t>
-            </a:r>
-            <a:r>
-              <a:rPr lang="en-US" dirty="0" smtClean="0">
-                <a:solidFill>
-                  <a:schemeClr val="tx1"/>
-                </a:solidFill>
-                <a:latin typeface="Andale Mono"/>
-                <a:cs typeface="Andale Mono"/>
-              </a:rPr>
-              <a:t> &lt;&lt; “Problem compiling </a:t>
-            </a:r>
-            <a:r>
-              <a:rPr lang="en-US" dirty="0" err="1" smtClean="0">
-                <a:solidFill>
-                  <a:schemeClr val="tx1"/>
-                </a:solidFill>
-                <a:latin typeface="Andale Mono"/>
-                <a:cs typeface="Andale Mono"/>
-              </a:rPr>
-              <a:t>test.ocl:\n</a:t>
-            </a:r>
-            <a:r>
-              <a:rPr lang="en-US" dirty="0" smtClean="0">
-                <a:solidFill>
-                  <a:schemeClr val="tx1"/>
-                </a:solidFill>
-                <a:latin typeface="Andale Mono"/>
-                <a:cs typeface="Andale Mono"/>
-              </a:rPr>
-              <a:t>”</a:t>
-            </a:r>
-          </a:p>
-          <a:p>
-            <a:r>
-              <a:rPr lang="en-US" dirty="0" smtClean="0">
-                <a:solidFill>
-                  <a:schemeClr val="tx1"/>
-                </a:solidFill>
-                <a:latin typeface="Andale Mono"/>
-                <a:cs typeface="Andale Mono"/>
-              </a:rPr>
-              <a:t>         &lt;&lt; clog &lt;&lt; </a:t>
-            </a:r>
-            <a:r>
-              <a:rPr lang="en-US" dirty="0" err="1" smtClean="0">
-                <a:solidFill>
-                  <a:schemeClr val="tx1"/>
-                </a:solidFill>
-                <a:latin typeface="Andale Mono"/>
-                <a:cs typeface="Andale Mono"/>
-              </a:rPr>
-              <a:t>endl</a:t>
-            </a:r>
-            <a:r>
-              <a:rPr lang="en-US" dirty="0" smtClean="0">
-                <a:solidFill>
-                  <a:schemeClr val="tx1"/>
-                </a:solidFill>
-                <a:latin typeface="Andale Mono"/>
-                <a:cs typeface="Andale Mono"/>
-              </a:rPr>
-              <a:t>;</a:t>
-            </a:r>
-          </a:p>
-          <a:p>
-            <a:r>
-              <a:rPr lang="en-US" dirty="0" smtClean="0">
-                <a:solidFill>
-                  <a:schemeClr val="tx1"/>
-                </a:solidFill>
-                <a:latin typeface="Andale Mono"/>
-                <a:cs typeface="Andale Mono"/>
-              </a:rPr>
-              <a:t>  exit(1);</a:t>
-            </a:r>
-          </a:p>
-          <a:p>
-            <a:r>
-              <a:rPr lang="en-US" dirty="0" smtClean="0">
-                <a:solidFill>
-                  <a:schemeClr val="tx1"/>
-                </a:solidFill>
-                <a:latin typeface="Andale Mono"/>
-                <a:cs typeface="Andale Mono"/>
-              </a:rPr>
               <a:t>}</a:t>
-            </a:r>
-          </a:p>
-          <a:p>
-            <a:r>
-              <a:rPr lang="en-US" dirty="0" smtClean="0">
-                <a:solidFill>
-                  <a:schemeClr val="tx1"/>
-                </a:solidFill>
-                <a:latin typeface="Andale Mono"/>
-                <a:cs typeface="Andale Mono"/>
-              </a:rPr>
-              <a:t>if (</a:t>
-            </a:r>
-            <a:r>
-              <a:rPr lang="en-US" dirty="0" err="1" smtClean="0">
-                <a:solidFill>
-                  <a:schemeClr val="tx1"/>
-                </a:solidFill>
-                <a:latin typeface="Andale Mono"/>
-                <a:cs typeface="Andale Mono"/>
-              </a:rPr>
-              <a:t>kernel.set_function(program,”foo</a:t>
-            </a:r>
-            <a:r>
-              <a:rPr lang="en-US" dirty="0" smtClean="0">
-                <a:solidFill>
-                  <a:schemeClr val="tx1"/>
-                </a:solidFill>
-                <a:latin typeface="Andale Mono"/>
-                <a:cs typeface="Andale Mono"/>
-              </a:rPr>
-              <a:t>”)!=UCL_SUCCESS)</a:t>
-            </a:r>
-          </a:p>
-          <a:p>
-            <a:r>
-              <a:rPr lang="en-US" dirty="0" smtClean="0">
-                <a:solidFill>
-                  <a:schemeClr val="tx1"/>
-                </a:solidFill>
-                <a:latin typeface="Andale Mono"/>
-                <a:cs typeface="Andale Mono"/>
-              </a:rPr>
-              <a:t>  </a:t>
-            </a:r>
-            <a:r>
-              <a:rPr lang="en-US" dirty="0" err="1" smtClean="0">
-                <a:solidFill>
-                  <a:schemeClr val="tx1"/>
-                </a:solidFill>
-                <a:latin typeface="Andale Mono"/>
-                <a:cs typeface="Andale Mono"/>
-              </a:rPr>
-              <a:t>cerr</a:t>
-            </a:r>
-            <a:r>
-              <a:rPr lang="en-US" dirty="0" smtClean="0">
-                <a:solidFill>
-                  <a:schemeClr val="tx1"/>
-                </a:solidFill>
-                <a:latin typeface="Andale Mono"/>
-                <a:cs typeface="Andale Mono"/>
-              </a:rPr>
-              <a:t> &lt;&lt; “Could not find function </a:t>
-            </a:r>
-            <a:r>
-              <a:rPr lang="en-US" dirty="0" err="1" smtClean="0">
-                <a:solidFill>
-                  <a:schemeClr val="tx1"/>
-                </a:solidFill>
-                <a:latin typeface="Andale Mono"/>
-                <a:cs typeface="Andale Mono"/>
-              </a:rPr>
-              <a:t>foo</a:t>
-            </a:r>
-            <a:r>
-              <a:rPr lang="en-US" dirty="0" smtClean="0">
-                <a:solidFill>
-                  <a:schemeClr val="tx1"/>
-                </a:solidFill>
-                <a:latin typeface="Andale Mono"/>
-                <a:cs typeface="Andale Mono"/>
-              </a:rPr>
-              <a:t> in </a:t>
-            </a:r>
-            <a:r>
-              <a:rPr lang="en-US" dirty="0" err="1" smtClean="0">
-                <a:solidFill>
-                  <a:schemeClr val="tx1"/>
-                </a:solidFill>
-                <a:latin typeface="Andale Mono"/>
-                <a:cs typeface="Andale Mono"/>
-              </a:rPr>
-              <a:t>test.ocl\n</a:t>
-            </a:r>
-            <a:r>
-              <a:rPr lang="en-US" dirty="0" smtClean="0">
-                <a:solidFill>
-                  <a:schemeClr val="tx1"/>
-                </a:solidFill>
-                <a:latin typeface="Andale Mono"/>
-                <a:cs typeface="Andale Mono"/>
-              </a:rPr>
-              <a:t>”;</a:t>
             </a:r>
           </a:p>
           <a:p>
@@ -21511,55 +21265,453 @@
       </p:grpSpPr>
       <p:sp>
         <p:nvSpPr>
-          <p:cNvPr id="2" name="Subtitle 1"/>
-          <p:cNvSpPr>
-            <a:spLocks noGrp="1"/>
-          </p:cNvSpPr>
-          <p:nvPr>
-            <p:ph type="subTitle" idx="1"/>
-          </p:nvPr>
+          <p:cNvPr id="2" name="TextBox 1"/>
+          <p:cNvSpPr txBox="1"/>
+          <p:nvPr/>
         </p:nvSpPr>
-        <p:spPr/>
+        <p:spPr>
+          <a:xfrm>
+            <a:off x="498159" y="1064458"/>
+            <a:ext cx="8292943" cy="4524316"/>
+          </a:xfrm>
+          <a:prstGeom prst="rect">
+            <a:avLst/>
+          </a:prstGeom>
+        </p:spPr>
+        <p:style>
+          <a:lnRef idx="2">
+            <a:schemeClr val="accent5"/>
+          </a:lnRef>
+          <a:fillRef idx="1">
+            <a:schemeClr val="lt1"/>
+          </a:fillRef>
+          <a:effectRef idx="0">
+            <a:schemeClr val="accent5"/>
+          </a:effectRef>
+          <a:fontRef idx="minor">
+            <a:schemeClr val="dk1"/>
+          </a:fontRef>
+        </p:style>
         <p:txBody>
-          <a:bodyPr/>
+          <a:bodyPr wrap="square" rtlCol="0">
+            <a:spAutoFit/>
+          </a:bodyPr>
           <a:lstStyle/>
           <a:p>
-            <a:r>
-              <a:rPr lang="en-US" dirty="0" smtClean="0"/>
-              <a:t>1D Texture Binding</a:t>
-            </a:r>
-            <a:endParaRPr lang="en-US" dirty="0"/>
-          </a:p>
-        </p:txBody>
-      </p:sp>
-      <p:sp>
-        <p:nvSpPr>
-          <p:cNvPr id="3" name="Title 2"/>
-          <p:cNvSpPr>
-            <a:spLocks noGrp="1"/>
-          </p:cNvSpPr>
-          <p:nvPr>
-            <p:ph type="ctrTitle"/>
-          </p:nvPr>
-        </p:nvSpPr>
-        <p:spPr/>
-        <p:txBody>
-          <a:bodyPr/>
-          <a:lstStyle/>
-          <a:p>
-            <a:r>
-              <a:rPr lang="en-US" dirty="0" err="1" smtClean="0"/>
-              <a:t>Geryon</a:t>
-            </a:r>
-            <a:endParaRPr lang="en-US" dirty="0"/>
+            <a:endParaRPr lang="en-US" dirty="0" smtClean="0">
+              <a:solidFill>
+                <a:schemeClr val="tx1"/>
+              </a:solidFill>
+              <a:latin typeface="Andale Mono"/>
+              <a:cs typeface="Andale Mono"/>
+            </a:endParaRPr>
+          </a:p>
+          <a:p>
+            <a:r>
+              <a:rPr lang="en-US" i="1" dirty="0" smtClean="0">
+                <a:solidFill>
+                  <a:srgbClr val="0000FF"/>
+                </a:solidFill>
+                <a:latin typeface="Andale Mono"/>
+                <a:cs typeface="Andale Mono"/>
+              </a:rPr>
+              <a:t>// To check for compiling errors</a:t>
+            </a:r>
+          </a:p>
+          <a:p>
+            <a:r>
+              <a:rPr lang="en-US" i="1" dirty="0" smtClean="0">
+                <a:solidFill>
+                  <a:srgbClr val="0000FF"/>
+                </a:solidFill>
+                <a:latin typeface="Andale Mono"/>
+                <a:cs typeface="Andale Mono"/>
+              </a:rPr>
+              <a:t>// -- Define UCL_NO_EXIT preprocessor directive</a:t>
+            </a:r>
+          </a:p>
+          <a:p>
+            <a:r>
+              <a:rPr lang="en-US" dirty="0" smtClean="0">
+                <a:solidFill>
+                  <a:schemeClr val="tx1"/>
+                </a:solidFill>
+                <a:latin typeface="Andale Mono"/>
+                <a:cs typeface="Andale Mono"/>
+              </a:rPr>
+              <a:t>string clog;</a:t>
+            </a:r>
+          </a:p>
+          <a:p>
+            <a:r>
+              <a:rPr lang="en-US" dirty="0" err="1" smtClean="0">
+                <a:solidFill>
+                  <a:schemeClr val="tx1"/>
+                </a:solidFill>
+                <a:latin typeface="Andale Mono"/>
+                <a:cs typeface="Andale Mono"/>
+              </a:rPr>
+              <a:t>int</a:t>
+            </a:r>
+            <a:r>
+              <a:rPr lang="en-US" dirty="0" smtClean="0">
+                <a:solidFill>
+                  <a:schemeClr val="tx1"/>
+                </a:solidFill>
+                <a:latin typeface="Andale Mono"/>
+                <a:cs typeface="Andale Mono"/>
+              </a:rPr>
+              <a:t> err=</a:t>
+            </a:r>
+            <a:r>
+              <a:rPr lang="en-US" dirty="0" err="1" smtClean="0">
+                <a:solidFill>
+                  <a:schemeClr val="tx1"/>
+                </a:solidFill>
+                <a:latin typeface="Andale Mono"/>
+                <a:cs typeface="Andale Mono"/>
+              </a:rPr>
+              <a:t>program.load(“test.ocl”,””,&amp;clog</a:t>
+            </a:r>
+            <a:r>
+              <a:rPr lang="en-US" dirty="0" smtClean="0">
+                <a:solidFill>
+                  <a:schemeClr val="tx1"/>
+                </a:solidFill>
+                <a:latin typeface="Andale Mono"/>
+                <a:cs typeface="Andale Mono"/>
+              </a:rPr>
+              <a:t>);</a:t>
+            </a:r>
+          </a:p>
+          <a:p>
+            <a:r>
+              <a:rPr lang="en-US" dirty="0" smtClean="0">
+                <a:solidFill>
+                  <a:schemeClr val="tx1"/>
+                </a:solidFill>
+                <a:latin typeface="Andale Mono"/>
+                <a:cs typeface="Andale Mono"/>
+              </a:rPr>
+              <a:t>if (err!=UCL_SUCCESS) {</a:t>
+            </a:r>
+          </a:p>
+          <a:p>
+            <a:r>
+              <a:rPr lang="en-US" dirty="0" smtClean="0">
+                <a:solidFill>
+                  <a:schemeClr val="tx1"/>
+                </a:solidFill>
+                <a:latin typeface="Andale Mono"/>
+                <a:cs typeface="Andale Mono"/>
+              </a:rPr>
+              <a:t>  if (err==UCL_FILE_NOT_FOUND)</a:t>
+            </a:r>
+          </a:p>
+          <a:p>
+            <a:r>
+              <a:rPr lang="en-US" dirty="0" smtClean="0">
+                <a:solidFill>
+                  <a:schemeClr val="tx1"/>
+                </a:solidFill>
+                <a:latin typeface="Andale Mono"/>
+                <a:cs typeface="Andale Mono"/>
+              </a:rPr>
+              <a:t>    </a:t>
+            </a:r>
+            <a:r>
+              <a:rPr lang="en-US" dirty="0" err="1" smtClean="0">
+                <a:solidFill>
+                  <a:schemeClr val="tx1"/>
+                </a:solidFill>
+                <a:latin typeface="Andale Mono"/>
+                <a:cs typeface="Andale Mono"/>
+              </a:rPr>
+              <a:t>cerr</a:t>
+            </a:r>
+            <a:r>
+              <a:rPr lang="en-US" dirty="0" smtClean="0">
+                <a:solidFill>
+                  <a:schemeClr val="tx1"/>
+                </a:solidFill>
+                <a:latin typeface="Andale Mono"/>
+                <a:cs typeface="Andale Mono"/>
+              </a:rPr>
+              <a:t> &lt;&lt; “Could not find </a:t>
+            </a:r>
+            <a:r>
+              <a:rPr lang="en-US" dirty="0" err="1" smtClean="0">
+                <a:solidFill>
+                  <a:schemeClr val="tx1"/>
+                </a:solidFill>
+                <a:latin typeface="Andale Mono"/>
+                <a:cs typeface="Andale Mono"/>
+              </a:rPr>
+              <a:t>test.ocl\n</a:t>
+            </a:r>
+            <a:r>
+              <a:rPr lang="en-US" dirty="0" smtClean="0">
+                <a:solidFill>
+                  <a:schemeClr val="tx1"/>
+                </a:solidFill>
+                <a:latin typeface="Andale Mono"/>
+                <a:cs typeface="Andale Mono"/>
+              </a:rPr>
+              <a:t>”;</a:t>
+            </a:r>
+          </a:p>
+          <a:p>
+            <a:r>
+              <a:rPr lang="en-US" dirty="0" smtClean="0">
+                <a:solidFill>
+                  <a:schemeClr val="tx1"/>
+                </a:solidFill>
+                <a:latin typeface="Andale Mono"/>
+                <a:cs typeface="Andale Mono"/>
+              </a:rPr>
+              <a:t>  if (err==UCL_COMPILE_ERROR)</a:t>
+            </a:r>
+          </a:p>
+          <a:p>
+            <a:r>
+              <a:rPr lang="en-US" dirty="0" smtClean="0">
+                <a:solidFill>
+                  <a:schemeClr val="tx1"/>
+                </a:solidFill>
+                <a:latin typeface="Andale Mono"/>
+                <a:cs typeface="Andale Mono"/>
+              </a:rPr>
+              <a:t>    </a:t>
+            </a:r>
+            <a:r>
+              <a:rPr lang="en-US" dirty="0" err="1" smtClean="0">
+                <a:solidFill>
+                  <a:schemeClr val="tx1"/>
+                </a:solidFill>
+                <a:latin typeface="Andale Mono"/>
+                <a:cs typeface="Andale Mono"/>
+              </a:rPr>
+              <a:t>cerr</a:t>
+            </a:r>
+            <a:r>
+              <a:rPr lang="en-US" dirty="0" smtClean="0">
+                <a:solidFill>
+                  <a:schemeClr val="tx1"/>
+                </a:solidFill>
+                <a:latin typeface="Andale Mono"/>
+                <a:cs typeface="Andale Mono"/>
+              </a:rPr>
+              <a:t> &lt;&lt; “Problem compiling </a:t>
+            </a:r>
+            <a:r>
+              <a:rPr lang="en-US" dirty="0" err="1" smtClean="0">
+                <a:solidFill>
+                  <a:schemeClr val="tx1"/>
+                </a:solidFill>
+                <a:latin typeface="Andale Mono"/>
+                <a:cs typeface="Andale Mono"/>
+              </a:rPr>
+              <a:t>test.ocl:\n</a:t>
+            </a:r>
+            <a:r>
+              <a:rPr lang="en-US" dirty="0" smtClean="0">
+                <a:solidFill>
+                  <a:schemeClr val="tx1"/>
+                </a:solidFill>
+                <a:latin typeface="Andale Mono"/>
+                <a:cs typeface="Andale Mono"/>
+              </a:rPr>
+              <a:t>”</a:t>
+            </a:r>
+          </a:p>
+          <a:p>
+            <a:r>
+              <a:rPr lang="en-US" dirty="0" smtClean="0">
+                <a:solidFill>
+                  <a:schemeClr val="tx1"/>
+                </a:solidFill>
+                <a:latin typeface="Andale Mono"/>
+                <a:cs typeface="Andale Mono"/>
+              </a:rPr>
+              <a:t>         &lt;&lt; clog &lt;&lt; </a:t>
+            </a:r>
+            <a:r>
+              <a:rPr lang="en-US" dirty="0" err="1" smtClean="0">
+                <a:solidFill>
+                  <a:schemeClr val="tx1"/>
+                </a:solidFill>
+                <a:latin typeface="Andale Mono"/>
+                <a:cs typeface="Andale Mono"/>
+              </a:rPr>
+              <a:t>endl</a:t>
+            </a:r>
+            <a:r>
+              <a:rPr lang="en-US" dirty="0" smtClean="0">
+                <a:solidFill>
+                  <a:schemeClr val="tx1"/>
+                </a:solidFill>
+                <a:latin typeface="Andale Mono"/>
+                <a:cs typeface="Andale Mono"/>
+              </a:rPr>
+              <a:t>;</a:t>
+            </a:r>
+          </a:p>
+          <a:p>
+            <a:r>
+              <a:rPr lang="en-US" dirty="0" smtClean="0">
+                <a:solidFill>
+                  <a:schemeClr val="tx1"/>
+                </a:solidFill>
+                <a:latin typeface="Andale Mono"/>
+                <a:cs typeface="Andale Mono"/>
+              </a:rPr>
+              <a:t>  exit(1);</a:t>
+            </a:r>
+          </a:p>
+          <a:p>
+            <a:r>
+              <a:rPr lang="en-US" dirty="0" smtClean="0">
+                <a:solidFill>
+                  <a:schemeClr val="tx1"/>
+                </a:solidFill>
+                <a:latin typeface="Andale Mono"/>
+                <a:cs typeface="Andale Mono"/>
+              </a:rPr>
+              <a:t>}</a:t>
+            </a:r>
+          </a:p>
+          <a:p>
+            <a:r>
+              <a:rPr lang="en-US" dirty="0" smtClean="0">
+                <a:solidFill>
+                  <a:schemeClr val="tx1"/>
+                </a:solidFill>
+                <a:latin typeface="Andale Mono"/>
+                <a:cs typeface="Andale Mono"/>
+              </a:rPr>
+              <a:t>if (</a:t>
+            </a:r>
+            <a:r>
+              <a:rPr lang="en-US" dirty="0" err="1" smtClean="0">
+                <a:solidFill>
+                  <a:schemeClr val="tx1"/>
+                </a:solidFill>
+                <a:latin typeface="Andale Mono"/>
+                <a:cs typeface="Andale Mono"/>
+              </a:rPr>
+              <a:t>kernel.set_function(program,”foo</a:t>
+            </a:r>
+            <a:r>
+              <a:rPr lang="en-US" dirty="0" smtClean="0">
+                <a:solidFill>
+                  <a:schemeClr val="tx1"/>
+                </a:solidFill>
+                <a:latin typeface="Andale Mono"/>
+                <a:cs typeface="Andale Mono"/>
+              </a:rPr>
+              <a:t>”)!=UCL_SUCCESS)</a:t>
+            </a:r>
+          </a:p>
+          <a:p>
+            <a:r>
+              <a:rPr lang="en-US" dirty="0" smtClean="0">
+                <a:solidFill>
+                  <a:schemeClr val="tx1"/>
+                </a:solidFill>
+                <a:latin typeface="Andale Mono"/>
+                <a:cs typeface="Andale Mono"/>
+              </a:rPr>
+              <a:t>  </a:t>
+            </a:r>
+            <a:r>
+              <a:rPr lang="en-US" dirty="0" err="1" smtClean="0">
+                <a:solidFill>
+                  <a:schemeClr val="tx1"/>
+                </a:solidFill>
+                <a:latin typeface="Andale Mono"/>
+                <a:cs typeface="Andale Mono"/>
+              </a:rPr>
+              <a:t>cerr</a:t>
+            </a:r>
+            <a:r>
+              <a:rPr lang="en-US" dirty="0" smtClean="0">
+                <a:solidFill>
+                  <a:schemeClr val="tx1"/>
+                </a:solidFill>
+                <a:latin typeface="Andale Mono"/>
+                <a:cs typeface="Andale Mono"/>
+              </a:rPr>
+              <a:t> &lt;&lt; “Could not find function </a:t>
+            </a:r>
+            <a:r>
+              <a:rPr lang="en-US" dirty="0" err="1" smtClean="0">
+                <a:solidFill>
+                  <a:schemeClr val="tx1"/>
+                </a:solidFill>
+                <a:latin typeface="Andale Mono"/>
+                <a:cs typeface="Andale Mono"/>
+              </a:rPr>
+              <a:t>foo</a:t>
+            </a:r>
+            <a:r>
+              <a:rPr lang="en-US" dirty="0" smtClean="0">
+                <a:solidFill>
+                  <a:schemeClr val="tx1"/>
+                </a:solidFill>
+                <a:latin typeface="Andale Mono"/>
+                <a:cs typeface="Andale Mono"/>
+              </a:rPr>
+              <a:t> in </a:t>
+            </a:r>
+            <a:r>
+              <a:rPr lang="en-US" dirty="0" err="1" smtClean="0">
+                <a:solidFill>
+                  <a:schemeClr val="tx1"/>
+                </a:solidFill>
+                <a:latin typeface="Andale Mono"/>
+                <a:cs typeface="Andale Mono"/>
+              </a:rPr>
+              <a:t>test.ocl\n</a:t>
+            </a:r>
+            <a:r>
+              <a:rPr lang="en-US" dirty="0" smtClean="0">
+                <a:solidFill>
+                  <a:schemeClr val="tx1"/>
+                </a:solidFill>
+                <a:latin typeface="Andale Mono"/>
+                <a:cs typeface="Andale Mono"/>
+              </a:rPr>
+              <a:t>”;</a:t>
+            </a:r>
+          </a:p>
+          <a:p>
+            <a:endParaRPr lang="en-US" dirty="0" smtClean="0">
+              <a:solidFill>
+                <a:schemeClr val="tx1"/>
+              </a:solidFill>
+              <a:latin typeface="Andale Mono"/>
+              <a:cs typeface="Andale Mono"/>
+            </a:endParaRPr>
           </a:p>
         </p:txBody>
       </p:sp>
     </p:spTree>
+    <p:extLst>
+      <p:ext uri="{BB962C8B-B14F-4D97-AF65-F5344CB8AC3E}">
+        <p14:creationId xmlns:p14="http://schemas.microsoft.com/office/powerpoint/2010/main" val="3590065680"/>
+      </p:ext>
+    </p:extLst>
   </p:cSld>
   <p:clrMapOvr>
     <a:masterClrMapping/>
   </p:clrMapOvr>
+  <p:timing>
+    <p:tnLst>
+      <p:par>
+        <p:cTn xmlns:p14="http://schemas.microsoft.com/office/powerpoint/2010/main" id="1" dur="indefinite" restart="never" nodeType="tmRoot"/>
+      </p:par>
+    </p:tnLst>
+  </p:timing>
 </p:sld>
 </file>
 
@@ -21582,12 +21734,12 @@
       </p:grpSpPr>
       <p:sp>
         <p:nvSpPr>
-          <p:cNvPr id="2" name="Title 1"/>
+          <p:cNvPr id="2" name="Subtitle 1"/>
           <p:cNvSpPr>
             <a:spLocks noGrp="1"/>
           </p:cNvSpPr>
           <p:nvPr>
-            <p:ph type="title"/>
+            <p:ph type="subTitle" idx="1"/>
           </p:nvPr>
         </p:nvSpPr>
         <p:spPr/>
@@ -21605,12 +21757,12 @@
       </p:sp>
       <p:sp>
         <p:nvSpPr>
-          <p:cNvPr id="3" name="Content Placeholder 2"/>
+          <p:cNvPr id="3" name="Title 2"/>
           <p:cNvSpPr>
             <a:spLocks noGrp="1"/>
           </p:cNvSpPr>
           <p:nvPr>
-            <p:ph sz="quarter" idx="1"/>
+            <p:ph type="ctrTitle"/>
           </p:nvPr>
         </p:nvSpPr>
         <p:spPr/>
@@ -21619,73 +21771,10 @@
           <a:lstStyle/>
           <a:p>
             <a:r>
-              <a:rPr lang="en-US" dirty="0" smtClean="0"/>
-              <a:t>In CUDA, can bind existing memory allocations to textures for constant access that can be cached</a:t>
-            </a:r>
-          </a:p>
-          <a:p>
-            <a:pPr lvl="1"/>
-            <a:r>
-              <a:rPr lang="en-US" dirty="0" smtClean="0"/>
-              <a:t>In </a:t>
-            </a:r>
-            <a:r>
               <a:rPr lang="en-US" dirty="0" err="1" smtClean="0"/>
               <a:t>Geryon</a:t>
             </a:r>
-            <a:r>
-              <a:rPr lang="en-US" dirty="0" smtClean="0"/>
-              <a:t>, this is accomplished by the </a:t>
-            </a:r>
-            <a:r>
-              <a:rPr lang="en-US" dirty="0" err="1" smtClean="0"/>
-              <a:t>UCL_Texture</a:t>
-            </a:r>
-            <a:r>
-              <a:rPr lang="en-US" dirty="0" smtClean="0"/>
-              <a:t> class</a:t>
-            </a:r>
-          </a:p>
-          <a:p>
-            <a:pPr lvl="1"/>
-            <a:r>
-              <a:rPr lang="en-US" dirty="0" smtClean="0"/>
-              <a:t>This feature is not currently in </a:t>
-            </a:r>
-            <a:r>
-              <a:rPr lang="en-US" dirty="0" err="1" smtClean="0"/>
-              <a:t>OpenCL</a:t>
-            </a:r>
-            <a:r>
-              <a:rPr lang="en-US" dirty="0" smtClean="0"/>
-              <a:t>, so </a:t>
-            </a:r>
-            <a:r>
-              <a:rPr lang="en-US" dirty="0" err="1" smtClean="0"/>
-              <a:t>UCL_Texture</a:t>
-            </a:r>
-            <a:r>
-              <a:rPr lang="en-US" dirty="0" smtClean="0"/>
-              <a:t> routines in the </a:t>
-            </a:r>
-            <a:r>
-              <a:rPr lang="en-US" dirty="0" err="1" smtClean="0"/>
-              <a:t>opencl</a:t>
-            </a:r>
-            <a:r>
-              <a:rPr lang="en-US" dirty="0" smtClean="0"/>
-              <a:t> namespace do nothing.</a:t>
-            </a:r>
-          </a:p>
-          <a:p>
-            <a:pPr lvl="1"/>
-            <a:r>
-              <a:rPr lang="en-US" dirty="0" smtClean="0"/>
-              <a:t>For textures, a vector length is specified; each fetch grabs a vector of the specified length</a:t>
-            </a:r>
-          </a:p>
-          <a:p>
-            <a:endParaRPr lang="en-US" dirty="0" smtClean="0"/>
+            <a:endParaRPr lang="en-US" dirty="0"/>
           </a:p>
         </p:txBody>
       </p:sp>
@@ -21724,19 +21813,14 @@
             <p:ph type="title"/>
           </p:nvPr>
         </p:nvSpPr>
-        <p:spPr>
-          <a:xfrm>
-            <a:off x="914400" y="277797"/>
-            <a:ext cx="7772400" cy="792605"/>
-          </a:xfrm>
-        </p:spPr>
+        <p:spPr/>
         <p:txBody>
           <a:bodyPr/>
           <a:lstStyle/>
           <a:p>
             <a:r>
               <a:rPr lang="en-US" dirty="0" smtClean="0"/>
-              <a:t>Assigning a texture reference</a:t>
+              <a:t>1D Texture Binding</a:t>
             </a:r>
             <a:endParaRPr lang="en-US" dirty="0"/>
           </a:p>
@@ -21752,550 +21836,79 @@
             <p:ph sz="quarter" idx="1"/>
           </p:nvPr>
         </p:nvSpPr>
-        <p:spPr>
-          <a:xfrm>
-            <a:off x="914400" y="1090644"/>
-            <a:ext cx="7772400" cy="576116"/>
-          </a:xfrm>
-        </p:spPr>
+        <p:spPr/>
         <p:txBody>
           <a:bodyPr/>
           <a:lstStyle/>
           <a:p>
             <a:r>
               <a:rPr lang="en-US" dirty="0" smtClean="0"/>
-              <a:t>CUDA Driver/</a:t>
+              <a:t>In CUDA, can bind existing memory allocations to textures for constant access that can be cached</a:t>
+            </a:r>
+          </a:p>
+          <a:p>
+            <a:pPr lvl="1"/>
+            <a:r>
+              <a:rPr lang="en-US" dirty="0" smtClean="0"/>
+              <a:t>In </a:t>
+            </a:r>
+            <a:r>
+              <a:rPr lang="en-US" dirty="0" err="1" smtClean="0"/>
+              <a:t>Geryon</a:t>
+            </a:r>
+            <a:r>
+              <a:rPr lang="en-US" dirty="0" smtClean="0"/>
+              <a:t>, this is accomplished by the </a:t>
+            </a:r>
+            <a:r>
+              <a:rPr lang="en-US" dirty="0" err="1" smtClean="0"/>
+              <a:t>UCL_Texture</a:t>
+            </a:r>
+            <a:r>
+              <a:rPr lang="en-US" dirty="0" smtClean="0"/>
+              <a:t> class</a:t>
+            </a:r>
+          </a:p>
+          <a:p>
+            <a:pPr lvl="1"/>
+            <a:r>
+              <a:rPr lang="en-US" dirty="0" smtClean="0"/>
+              <a:t>This feature is not currently in </a:t>
             </a:r>
             <a:r>
               <a:rPr lang="en-US" dirty="0" err="1" smtClean="0"/>
               <a:t>OpenCL</a:t>
             </a:r>
+            <a:r>
+              <a:rPr lang="en-US" dirty="0" smtClean="0"/>
+              <a:t>, so </a:t>
+            </a:r>
+            <a:r>
+              <a:rPr lang="en-US" dirty="0" err="1" smtClean="0"/>
+              <a:t>UCL_Texture</a:t>
+            </a:r>
+            <a:r>
+              <a:rPr lang="en-US" dirty="0" smtClean="0"/>
+              <a:t> routines in the </a:t>
+            </a:r>
+            <a:r>
+              <a:rPr lang="en-US" dirty="0" err="1" smtClean="0"/>
+              <a:t>opencl</a:t>
+            </a:r>
+            <a:r>
+              <a:rPr lang="en-US" dirty="0" smtClean="0"/>
+              <a:t> namespace do nothing.</a:t>
+            </a:r>
+          </a:p>
+          <a:p>
+            <a:pPr lvl="1"/>
+            <a:r>
+              <a:rPr lang="en-US" dirty="0" smtClean="0"/>
+              <a:t>For textures, a vector length is specified; each fetch grabs a vector of the specified length</a:t>
+            </a:r>
+          </a:p>
+          <a:p>
             <a:endParaRPr lang="en-US" dirty="0" smtClean="0"/>
-          </a:p>
-        </p:txBody>
-      </p:sp>
-      <p:sp>
-        <p:nvSpPr>
-          <p:cNvPr id="4" name="TextBox 3"/>
-          <p:cNvSpPr txBox="1"/>
-          <p:nvPr/>
-        </p:nvSpPr>
-        <p:spPr>
-          <a:xfrm>
-            <a:off x="914400" y="1656842"/>
-            <a:ext cx="6854217" cy="2031325"/>
-          </a:xfrm>
-          <a:prstGeom prst="rect">
-            <a:avLst/>
-          </a:prstGeom>
-        </p:spPr>
-        <p:style>
-          <a:lnRef idx="2">
-            <a:schemeClr val="accent5"/>
-          </a:lnRef>
-          <a:fillRef idx="1">
-            <a:schemeClr val="lt1"/>
-          </a:fillRef>
-          <a:effectRef idx="0">
-            <a:schemeClr val="accent5"/>
-          </a:effectRef>
-          <a:fontRef idx="minor">
-            <a:schemeClr val="dk1"/>
-          </a:fontRef>
-        </p:style>
-        <p:txBody>
-          <a:bodyPr wrap="square" rtlCol="0">
-            <a:spAutoFit/>
-          </a:bodyPr>
-          <a:lstStyle/>
-          <a:p>
-            <a:r>
-              <a:rPr lang="en-US" dirty="0" smtClean="0">
-                <a:solidFill>
-                  <a:schemeClr val="tx1"/>
-                </a:solidFill>
-                <a:latin typeface="Andale Mono"/>
-                <a:cs typeface="Andale Mono"/>
-              </a:rPr>
-              <a:t>#include “</a:t>
-            </a:r>
-            <a:r>
-              <a:rPr lang="en-US" dirty="0" err="1" smtClean="0">
-                <a:solidFill>
-                  <a:schemeClr val="tx1"/>
-                </a:solidFill>
-                <a:latin typeface="Andale Mono"/>
-                <a:cs typeface="Andale Mono"/>
-              </a:rPr>
-              <a:t>nvd_texture.h</a:t>
-            </a:r>
-            <a:r>
-              <a:rPr lang="en-US" dirty="0" smtClean="0">
-                <a:solidFill>
-                  <a:schemeClr val="tx1"/>
-                </a:solidFill>
-                <a:latin typeface="Andale Mono"/>
-                <a:cs typeface="Andale Mono"/>
-              </a:rPr>
-              <a:t>”</a:t>
-            </a:r>
-          </a:p>
-          <a:p>
-            <a:endParaRPr lang="en-US" i="1" dirty="0" smtClean="0">
-              <a:solidFill>
-                <a:srgbClr val="0000FF"/>
-              </a:solidFill>
-              <a:latin typeface="Andale Mono"/>
-              <a:cs typeface="Andale Mono"/>
-            </a:endParaRPr>
-          </a:p>
-          <a:p>
-            <a:r>
-              <a:rPr lang="en-US" i="1" dirty="0" smtClean="0">
-                <a:solidFill>
-                  <a:srgbClr val="0000FF"/>
-                </a:solidFill>
-                <a:latin typeface="Andale Mono"/>
-                <a:cs typeface="Andale Mono"/>
-              </a:rPr>
-              <a:t>// Texture must be defined within a Program</a:t>
-            </a:r>
-          </a:p>
-          <a:p>
-            <a:r>
-              <a:rPr lang="en-US" dirty="0" err="1" smtClean="0">
-                <a:solidFill>
-                  <a:schemeClr val="tx1"/>
-                </a:solidFill>
-                <a:latin typeface="Andale Mono"/>
-                <a:cs typeface="Andale Mono"/>
-              </a:rPr>
-              <a:t>UCL_Texture</a:t>
-            </a:r>
-            <a:r>
-              <a:rPr lang="en-US" dirty="0" smtClean="0">
-                <a:solidFill>
-                  <a:schemeClr val="tx1"/>
-                </a:solidFill>
-                <a:latin typeface="Andale Mono"/>
-                <a:cs typeface="Andale Mono"/>
-              </a:rPr>
-              <a:t> </a:t>
-            </a:r>
-            <a:r>
-              <a:rPr lang="en-US" dirty="0" err="1" smtClean="0">
-                <a:solidFill>
-                  <a:schemeClr val="tx1"/>
-                </a:solidFill>
-                <a:latin typeface="Andale Mono"/>
-                <a:cs typeface="Andale Mono"/>
-              </a:rPr>
-              <a:t>my_tex(my_program,”texture_name</a:t>
-            </a:r>
-            <a:r>
-              <a:rPr lang="en-US" dirty="0" smtClean="0">
-                <a:solidFill>
-                  <a:schemeClr val="tx1"/>
-                </a:solidFill>
-                <a:latin typeface="Andale Mono"/>
-                <a:cs typeface="Andale Mono"/>
-              </a:rPr>
-              <a:t>”);</a:t>
-            </a:r>
-          </a:p>
-          <a:p>
-            <a:r>
-              <a:rPr lang="en-US" i="1" dirty="0" smtClean="0">
-                <a:solidFill>
-                  <a:srgbClr val="0000FF"/>
-                </a:solidFill>
-                <a:latin typeface="Andale Mono"/>
-                <a:cs typeface="Andale Mono"/>
-              </a:rPr>
-              <a:t>// -- or –</a:t>
-            </a:r>
-            <a:endParaRPr lang="en-US" dirty="0" smtClean="0">
-              <a:solidFill>
-                <a:schemeClr val="tx1"/>
-              </a:solidFill>
-              <a:latin typeface="Andale Mono"/>
-              <a:cs typeface="Andale Mono"/>
-            </a:endParaRPr>
-          </a:p>
-          <a:p>
-            <a:r>
-              <a:rPr lang="en-US" dirty="0" err="1" smtClean="0">
-                <a:solidFill>
-                  <a:schemeClr val="tx1"/>
-                </a:solidFill>
-                <a:latin typeface="Andale Mono"/>
-                <a:cs typeface="Andale Mono"/>
-              </a:rPr>
-              <a:t>UCL_Texture</a:t>
-            </a:r>
-            <a:r>
-              <a:rPr lang="en-US" dirty="0" smtClean="0">
-                <a:solidFill>
-                  <a:schemeClr val="tx1"/>
-                </a:solidFill>
-                <a:latin typeface="Andale Mono"/>
-                <a:cs typeface="Andale Mono"/>
-              </a:rPr>
-              <a:t> </a:t>
-            </a:r>
-            <a:r>
-              <a:rPr lang="en-US" dirty="0" err="1" smtClean="0">
-                <a:solidFill>
-                  <a:schemeClr val="tx1"/>
-                </a:solidFill>
-                <a:latin typeface="Andale Mono"/>
-                <a:cs typeface="Andale Mono"/>
-              </a:rPr>
-              <a:t>my_tex</a:t>
-            </a:r>
-            <a:r>
-              <a:rPr lang="en-US" dirty="0" smtClean="0">
-                <a:solidFill>
-                  <a:schemeClr val="tx1"/>
-                </a:solidFill>
-                <a:latin typeface="Andale Mono"/>
-                <a:cs typeface="Andale Mono"/>
-              </a:rPr>
-              <a:t>;</a:t>
-            </a:r>
-          </a:p>
-          <a:p>
-            <a:r>
-              <a:rPr lang="en-US" dirty="0" err="1" smtClean="0">
-                <a:solidFill>
-                  <a:schemeClr val="tx1"/>
-                </a:solidFill>
-                <a:latin typeface="Andale Mono"/>
-                <a:cs typeface="Andale Mono"/>
-              </a:rPr>
-              <a:t>my_tex.get_texture(my_program,”texture_name</a:t>
-            </a:r>
-            <a:r>
-              <a:rPr lang="en-US" dirty="0" smtClean="0">
-                <a:solidFill>
-                  <a:schemeClr val="tx1"/>
-                </a:solidFill>
-                <a:latin typeface="Andale Mono"/>
-                <a:cs typeface="Andale Mono"/>
-              </a:rPr>
-              <a:t>”);</a:t>
-            </a:r>
-          </a:p>
-        </p:txBody>
-      </p:sp>
-      <p:sp>
-        <p:nvSpPr>
-          <p:cNvPr id="5" name="Content Placeholder 2"/>
-          <p:cNvSpPr txBox="1">
-            <a:spLocks/>
-          </p:cNvSpPr>
-          <p:nvPr/>
-        </p:nvSpPr>
-        <p:spPr>
-          <a:xfrm>
-            <a:off x="1066800" y="3739597"/>
-            <a:ext cx="7772400" cy="576116"/>
-          </a:xfrm>
-          <a:prstGeom prst="rect">
-            <a:avLst/>
-          </a:prstGeom>
-        </p:spPr>
-        <p:txBody>
-          <a:bodyPr vert="horz">
-            <a:normAutofit/>
-          </a:bodyPr>
-          <a:lstStyle/>
-          <a:p>
-            <a:pPr marL="274320" marR="0" lvl="0" indent="-274320" algn="l" defTabSz="914400" rtl="0" eaLnBrk="1" fontAlgn="auto" latinLnBrk="0" hangingPunct="1">
-              <a:lnSpc>
-                <a:spcPct val="100000"/>
-              </a:lnSpc>
-              <a:spcBef>
-                <a:spcPts val="580"/>
-              </a:spcBef>
-              <a:spcAft>
-                <a:spcPts val="0"/>
-              </a:spcAft>
-              <a:buClr>
-                <a:schemeClr val="accent1"/>
-              </a:buClr>
-              <a:buSzPct val="85000"/>
-              <a:buFont typeface="Wingdings 2"/>
-              <a:buChar char=""/>
-              <a:tabLst/>
-              <a:defRPr/>
-            </a:pPr>
-            <a:r>
-              <a:rPr kumimoji="0" lang="en-US" sz="2600" b="0" i="0" u="none" strike="noStrike" kern="1200" cap="none" spc="0" normalizeH="0" baseline="0" noProof="0" dirty="0" smtClean="0">
-                <a:ln>
-                  <a:noFill/>
-                </a:ln>
-                <a:solidFill>
-                  <a:schemeClr val="tx1"/>
-                </a:solidFill>
-                <a:effectLst/>
-                <a:uLnTx/>
-                <a:uFillTx/>
-                <a:latin typeface="+mn-lt"/>
-                <a:ea typeface="+mn-ea"/>
-                <a:cs typeface="+mn-cs"/>
-              </a:rPr>
-              <a:t>CUDA Runtime</a:t>
-            </a:r>
-          </a:p>
-        </p:txBody>
-      </p:sp>
-      <p:sp>
-        <p:nvSpPr>
-          <p:cNvPr id="6" name="TextBox 5"/>
-          <p:cNvSpPr txBox="1"/>
-          <p:nvPr/>
-        </p:nvSpPr>
-        <p:spPr>
-          <a:xfrm>
-            <a:off x="962498" y="4315714"/>
-            <a:ext cx="6806119" cy="2308324"/>
-          </a:xfrm>
-          <a:prstGeom prst="rect">
-            <a:avLst/>
-          </a:prstGeom>
-        </p:spPr>
-        <p:style>
-          <a:lnRef idx="2">
-            <a:schemeClr val="accent5"/>
-          </a:lnRef>
-          <a:fillRef idx="1">
-            <a:schemeClr val="lt1"/>
-          </a:fillRef>
-          <a:effectRef idx="0">
-            <a:schemeClr val="accent5"/>
-          </a:effectRef>
-          <a:fontRef idx="minor">
-            <a:schemeClr val="dk1"/>
-          </a:fontRef>
-        </p:style>
-        <p:txBody>
-          <a:bodyPr wrap="square" rtlCol="0">
-            <a:spAutoFit/>
-          </a:bodyPr>
-          <a:lstStyle/>
-          <a:p>
-            <a:r>
-              <a:rPr lang="en-US" dirty="0" smtClean="0">
-                <a:solidFill>
-                  <a:schemeClr val="tx1"/>
-                </a:solidFill>
-                <a:latin typeface="Andale Mono"/>
-                <a:cs typeface="Andale Mono"/>
-              </a:rPr>
-              <a:t>#include “</a:t>
-            </a:r>
-            <a:r>
-              <a:rPr lang="en-US" dirty="0" err="1" smtClean="0">
-                <a:solidFill>
-                  <a:schemeClr val="tx1"/>
-                </a:solidFill>
-                <a:latin typeface="Andale Mono"/>
-                <a:cs typeface="Andale Mono"/>
-              </a:rPr>
-              <a:t>nvc_texture.h</a:t>
-            </a:r>
-            <a:r>
-              <a:rPr lang="en-US" dirty="0" smtClean="0">
-                <a:solidFill>
-                  <a:schemeClr val="tx1"/>
-                </a:solidFill>
-                <a:latin typeface="Andale Mono"/>
-                <a:cs typeface="Andale Mono"/>
-              </a:rPr>
-              <a:t>”</a:t>
-            </a:r>
-          </a:p>
-          <a:p>
-            <a:r>
-              <a:rPr lang="en-US" i="1" dirty="0" smtClean="0">
-                <a:solidFill>
-                  <a:srgbClr val="0000FF"/>
-                </a:solidFill>
-                <a:latin typeface="Andale Mono"/>
-                <a:cs typeface="Andale Mono"/>
-              </a:rPr>
-              <a:t>// Texture must be defined within same file</a:t>
-            </a:r>
-          </a:p>
-          <a:p>
-            <a:r>
-              <a:rPr lang="en-US" dirty="0" smtClean="0">
-                <a:solidFill>
-                  <a:schemeClr val="tx1"/>
-                </a:solidFill>
-                <a:latin typeface="Andale Mono"/>
-                <a:cs typeface="Andale Mono"/>
-              </a:rPr>
-              <a:t>texture&lt;float2&gt; </a:t>
-            </a:r>
-            <a:r>
-              <a:rPr lang="en-US" dirty="0" err="1" smtClean="0">
-                <a:solidFill>
-                  <a:schemeClr val="tx1"/>
-                </a:solidFill>
-                <a:latin typeface="Andale Mono"/>
-                <a:cs typeface="Andale Mono"/>
-              </a:rPr>
-              <a:t>tex</a:t>
-            </a:r>
-            <a:r>
-              <a:rPr lang="en-US" dirty="0" smtClean="0">
-                <a:solidFill>
-                  <a:schemeClr val="tx1"/>
-                </a:solidFill>
-                <a:latin typeface="Andale Mono"/>
-                <a:cs typeface="Andale Mono"/>
-              </a:rPr>
-              <a:t>;</a:t>
-            </a:r>
-          </a:p>
-          <a:p>
-            <a:r>
-              <a:rPr lang="en-US" dirty="0" smtClean="0">
-                <a:solidFill>
-                  <a:schemeClr val="tx1"/>
-                </a:solidFill>
-                <a:latin typeface="Andale Mono"/>
-                <a:cs typeface="Andale Mono"/>
-              </a:rPr>
-              <a:t> </a:t>
-            </a:r>
-          </a:p>
-          <a:p>
-            <a:r>
-              <a:rPr lang="en-US" dirty="0" err="1" smtClean="0">
-                <a:solidFill>
-                  <a:schemeClr val="tx1"/>
-                </a:solidFill>
-                <a:latin typeface="Andale Mono"/>
-                <a:cs typeface="Andale Mono"/>
-              </a:rPr>
-              <a:t>UCL_Texture</a:t>
-            </a:r>
-            <a:r>
-              <a:rPr lang="en-US" dirty="0" smtClean="0">
-                <a:solidFill>
-                  <a:schemeClr val="tx1"/>
-                </a:solidFill>
-                <a:latin typeface="Andale Mono"/>
-                <a:cs typeface="Andale Mono"/>
-              </a:rPr>
-              <a:t> </a:t>
-            </a:r>
-            <a:r>
-              <a:rPr lang="en-US" dirty="0" err="1" smtClean="0">
-                <a:solidFill>
-                  <a:schemeClr val="tx1"/>
-                </a:solidFill>
-                <a:latin typeface="Andale Mono"/>
-                <a:cs typeface="Andale Mono"/>
-              </a:rPr>
-              <a:t>my_tex(tex</a:t>
-            </a:r>
-            <a:r>
-              <a:rPr lang="en-US" dirty="0" smtClean="0">
-                <a:solidFill>
-                  <a:schemeClr val="tx1"/>
-                </a:solidFill>
-                <a:latin typeface="Andale Mono"/>
-                <a:cs typeface="Andale Mono"/>
-              </a:rPr>
-              <a:t>);</a:t>
-            </a:r>
-          </a:p>
-          <a:p>
-            <a:r>
-              <a:rPr lang="en-US" i="1" dirty="0" smtClean="0">
-                <a:solidFill>
-                  <a:srgbClr val="0000FF"/>
-                </a:solidFill>
-                <a:latin typeface="Andale Mono"/>
-                <a:cs typeface="Andale Mono"/>
-              </a:rPr>
-              <a:t>// -- or –</a:t>
-            </a:r>
-            <a:endParaRPr lang="en-US" dirty="0" smtClean="0">
-              <a:solidFill>
-                <a:schemeClr val="tx1"/>
-              </a:solidFill>
-              <a:latin typeface="Andale Mono"/>
-              <a:cs typeface="Andale Mono"/>
-            </a:endParaRPr>
-          </a:p>
-          <a:p>
-            <a:r>
-              <a:rPr lang="en-US" dirty="0" err="1" smtClean="0">
-                <a:solidFill>
-                  <a:schemeClr val="tx1"/>
-                </a:solidFill>
-                <a:latin typeface="Andale Mono"/>
-                <a:cs typeface="Andale Mono"/>
-              </a:rPr>
-              <a:t>UCL_Texture</a:t>
-            </a:r>
-            <a:r>
-              <a:rPr lang="en-US" dirty="0" smtClean="0">
-                <a:solidFill>
-                  <a:schemeClr val="tx1"/>
-                </a:solidFill>
-                <a:latin typeface="Andale Mono"/>
-                <a:cs typeface="Andale Mono"/>
-              </a:rPr>
-              <a:t> </a:t>
-            </a:r>
-            <a:r>
-              <a:rPr lang="en-US" dirty="0" err="1" smtClean="0">
-                <a:solidFill>
-                  <a:schemeClr val="tx1"/>
-                </a:solidFill>
-                <a:latin typeface="Andale Mono"/>
-                <a:cs typeface="Andale Mono"/>
-              </a:rPr>
-              <a:t>my_tex</a:t>
-            </a:r>
-            <a:r>
-              <a:rPr lang="en-US" dirty="0" smtClean="0">
-                <a:solidFill>
-                  <a:schemeClr val="tx1"/>
-                </a:solidFill>
-                <a:latin typeface="Andale Mono"/>
-                <a:cs typeface="Andale Mono"/>
-              </a:rPr>
-              <a:t>;</a:t>
-            </a:r>
-          </a:p>
-          <a:p>
-            <a:r>
-              <a:rPr lang="en-US" dirty="0" err="1" smtClean="0">
-                <a:solidFill>
-                  <a:schemeClr val="tx1"/>
-                </a:solidFill>
-                <a:latin typeface="Andale Mono"/>
-                <a:cs typeface="Andale Mono"/>
-              </a:rPr>
-              <a:t>my_tex.get_texture(tex</a:t>
-            </a:r>
-            <a:r>
-              <a:rPr lang="en-US" dirty="0" smtClean="0">
-                <a:solidFill>
-                  <a:schemeClr val="tx1"/>
-                </a:solidFill>
-                <a:latin typeface="Andale Mono"/>
-                <a:cs typeface="Andale Mono"/>
-              </a:rPr>
-              <a:t>);</a:t>
-            </a:r>
           </a:p>
         </p:txBody>
       </p:sp>
@@ -22334,6 +21947,616 @@
             <p:ph type="title"/>
           </p:nvPr>
         </p:nvSpPr>
+        <p:spPr>
+          <a:xfrm>
+            <a:off x="914400" y="277797"/>
+            <a:ext cx="7772400" cy="792605"/>
+          </a:xfrm>
+        </p:spPr>
+        <p:txBody>
+          <a:bodyPr/>
+          <a:lstStyle/>
+          <a:p>
+            <a:r>
+              <a:rPr lang="en-US" dirty="0" smtClean="0"/>
+              <a:t>Assigning a texture reference</a:t>
+            </a:r>
+            <a:endParaRPr lang="en-US" dirty="0"/>
+          </a:p>
+        </p:txBody>
+      </p:sp>
+      <p:sp>
+        <p:nvSpPr>
+          <p:cNvPr id="3" name="Content Placeholder 2"/>
+          <p:cNvSpPr>
+            <a:spLocks noGrp="1"/>
+          </p:cNvSpPr>
+          <p:nvPr>
+            <p:ph sz="quarter" idx="1"/>
+          </p:nvPr>
+        </p:nvSpPr>
+        <p:spPr>
+          <a:xfrm>
+            <a:off x="914400" y="1090644"/>
+            <a:ext cx="7772400" cy="576116"/>
+          </a:xfrm>
+        </p:spPr>
+        <p:txBody>
+          <a:bodyPr/>
+          <a:lstStyle/>
+          <a:p>
+            <a:r>
+              <a:rPr lang="en-US" dirty="0" smtClean="0"/>
+              <a:t>CUDA Driver/</a:t>
+            </a:r>
+            <a:r>
+              <a:rPr lang="en-US" dirty="0" err="1" smtClean="0"/>
+              <a:t>OpenCL</a:t>
+            </a:r>
+            <a:endParaRPr lang="en-US" dirty="0" smtClean="0"/>
+          </a:p>
+        </p:txBody>
+      </p:sp>
+      <p:sp>
+        <p:nvSpPr>
+          <p:cNvPr id="4" name="TextBox 3"/>
+          <p:cNvSpPr txBox="1"/>
+          <p:nvPr/>
+        </p:nvSpPr>
+        <p:spPr>
+          <a:xfrm>
+            <a:off x="914400" y="1656842"/>
+            <a:ext cx="6854217" cy="2031325"/>
+          </a:xfrm>
+          <a:prstGeom prst="rect">
+            <a:avLst/>
+          </a:prstGeom>
+        </p:spPr>
+        <p:style>
+          <a:lnRef idx="2">
+            <a:schemeClr val="accent5"/>
+          </a:lnRef>
+          <a:fillRef idx="1">
+            <a:schemeClr val="lt1"/>
+          </a:fillRef>
+          <a:effectRef idx="0">
+            <a:schemeClr val="accent5"/>
+          </a:effectRef>
+          <a:fontRef idx="minor">
+            <a:schemeClr val="dk1"/>
+          </a:fontRef>
+        </p:style>
+        <p:txBody>
+          <a:bodyPr wrap="square" rtlCol="0">
+            <a:spAutoFit/>
+          </a:bodyPr>
+          <a:lstStyle/>
+          <a:p>
+            <a:r>
+              <a:rPr lang="en-US" dirty="0" smtClean="0">
+                <a:solidFill>
+                  <a:schemeClr val="tx1"/>
+                </a:solidFill>
+                <a:latin typeface="Andale Mono"/>
+                <a:cs typeface="Andale Mono"/>
+              </a:rPr>
+              <a:t>#include “</a:t>
+            </a:r>
+            <a:r>
+              <a:rPr lang="en-US" dirty="0" err="1" smtClean="0">
+                <a:solidFill>
+                  <a:schemeClr val="tx1"/>
+                </a:solidFill>
+                <a:latin typeface="Andale Mono"/>
+                <a:cs typeface="Andale Mono"/>
+              </a:rPr>
+              <a:t>nvd_texture.h</a:t>
+            </a:r>
+            <a:r>
+              <a:rPr lang="en-US" dirty="0" smtClean="0">
+                <a:solidFill>
+                  <a:schemeClr val="tx1"/>
+                </a:solidFill>
+                <a:latin typeface="Andale Mono"/>
+                <a:cs typeface="Andale Mono"/>
+              </a:rPr>
+              <a:t>”</a:t>
+            </a:r>
+          </a:p>
+          <a:p>
+            <a:endParaRPr lang="en-US" i="1" dirty="0" smtClean="0">
+              <a:solidFill>
+                <a:srgbClr val="0000FF"/>
+              </a:solidFill>
+              <a:latin typeface="Andale Mono"/>
+              <a:cs typeface="Andale Mono"/>
+            </a:endParaRPr>
+          </a:p>
+          <a:p>
+            <a:r>
+              <a:rPr lang="en-US" i="1" dirty="0" smtClean="0">
+                <a:solidFill>
+                  <a:srgbClr val="0000FF"/>
+                </a:solidFill>
+                <a:latin typeface="Andale Mono"/>
+                <a:cs typeface="Andale Mono"/>
+              </a:rPr>
+              <a:t>// Texture must be defined within a Program</a:t>
+            </a:r>
+          </a:p>
+          <a:p>
+            <a:r>
+              <a:rPr lang="en-US" dirty="0" err="1" smtClean="0">
+                <a:solidFill>
+                  <a:schemeClr val="tx1"/>
+                </a:solidFill>
+                <a:latin typeface="Andale Mono"/>
+                <a:cs typeface="Andale Mono"/>
+              </a:rPr>
+              <a:t>UCL_Texture</a:t>
+            </a:r>
+            <a:r>
+              <a:rPr lang="en-US" dirty="0" smtClean="0">
+                <a:solidFill>
+                  <a:schemeClr val="tx1"/>
+                </a:solidFill>
+                <a:latin typeface="Andale Mono"/>
+                <a:cs typeface="Andale Mono"/>
+              </a:rPr>
+              <a:t> </a:t>
+            </a:r>
+            <a:r>
+              <a:rPr lang="en-US" dirty="0" err="1" smtClean="0">
+                <a:solidFill>
+                  <a:schemeClr val="tx1"/>
+                </a:solidFill>
+                <a:latin typeface="Andale Mono"/>
+                <a:cs typeface="Andale Mono"/>
+              </a:rPr>
+              <a:t>my_tex(my_program,”texture_name</a:t>
+            </a:r>
+            <a:r>
+              <a:rPr lang="en-US" dirty="0" smtClean="0">
+                <a:solidFill>
+                  <a:schemeClr val="tx1"/>
+                </a:solidFill>
+                <a:latin typeface="Andale Mono"/>
+                <a:cs typeface="Andale Mono"/>
+              </a:rPr>
+              <a:t>”);</a:t>
+            </a:r>
+          </a:p>
+          <a:p>
+            <a:r>
+              <a:rPr lang="en-US" i="1" dirty="0" smtClean="0">
+                <a:solidFill>
+                  <a:srgbClr val="0000FF"/>
+                </a:solidFill>
+                <a:latin typeface="Andale Mono"/>
+                <a:cs typeface="Andale Mono"/>
+              </a:rPr>
+              <a:t>// -- or –</a:t>
+            </a:r>
+            <a:endParaRPr lang="en-US" dirty="0" smtClean="0">
+              <a:solidFill>
+                <a:schemeClr val="tx1"/>
+              </a:solidFill>
+              <a:latin typeface="Andale Mono"/>
+              <a:cs typeface="Andale Mono"/>
+            </a:endParaRPr>
+          </a:p>
+          <a:p>
+            <a:r>
+              <a:rPr lang="en-US" dirty="0" err="1" smtClean="0">
+                <a:solidFill>
+                  <a:schemeClr val="tx1"/>
+                </a:solidFill>
+                <a:latin typeface="Andale Mono"/>
+                <a:cs typeface="Andale Mono"/>
+              </a:rPr>
+              <a:t>UCL_Texture</a:t>
+            </a:r>
+            <a:r>
+              <a:rPr lang="en-US" dirty="0" smtClean="0">
+                <a:solidFill>
+                  <a:schemeClr val="tx1"/>
+                </a:solidFill>
+                <a:latin typeface="Andale Mono"/>
+                <a:cs typeface="Andale Mono"/>
+              </a:rPr>
+              <a:t> </a:t>
+            </a:r>
+            <a:r>
+              <a:rPr lang="en-US" dirty="0" err="1" smtClean="0">
+                <a:solidFill>
+                  <a:schemeClr val="tx1"/>
+                </a:solidFill>
+                <a:latin typeface="Andale Mono"/>
+                <a:cs typeface="Andale Mono"/>
+              </a:rPr>
+              <a:t>my_tex</a:t>
+            </a:r>
+            <a:r>
+              <a:rPr lang="en-US" dirty="0" smtClean="0">
+                <a:solidFill>
+                  <a:schemeClr val="tx1"/>
+                </a:solidFill>
+                <a:latin typeface="Andale Mono"/>
+                <a:cs typeface="Andale Mono"/>
+              </a:rPr>
+              <a:t>;</a:t>
+            </a:r>
+          </a:p>
+          <a:p>
+            <a:r>
+              <a:rPr lang="en-US" dirty="0" err="1" smtClean="0">
+                <a:solidFill>
+                  <a:schemeClr val="tx1"/>
+                </a:solidFill>
+                <a:latin typeface="Andale Mono"/>
+                <a:cs typeface="Andale Mono"/>
+              </a:rPr>
+              <a:t>my_tex.get_texture(my_program,”texture_name</a:t>
+            </a:r>
+            <a:r>
+              <a:rPr lang="en-US" dirty="0" smtClean="0">
+                <a:solidFill>
+                  <a:schemeClr val="tx1"/>
+                </a:solidFill>
+                <a:latin typeface="Andale Mono"/>
+                <a:cs typeface="Andale Mono"/>
+              </a:rPr>
+              <a:t>”);</a:t>
+            </a:r>
+          </a:p>
+        </p:txBody>
+      </p:sp>
+      <p:sp>
+        <p:nvSpPr>
+          <p:cNvPr id="5" name="Content Placeholder 2"/>
+          <p:cNvSpPr txBox="1">
+            <a:spLocks/>
+          </p:cNvSpPr>
+          <p:nvPr/>
+        </p:nvSpPr>
+        <p:spPr>
+          <a:xfrm>
+            <a:off x="1066800" y="3739597"/>
+            <a:ext cx="7772400" cy="576116"/>
+          </a:xfrm>
+          <a:prstGeom prst="rect">
+            <a:avLst/>
+          </a:prstGeom>
+        </p:spPr>
+        <p:txBody>
+          <a:bodyPr vert="horz">
+            <a:normAutofit/>
+          </a:bodyPr>
+          <a:lstStyle/>
+          <a:p>
+            <a:pPr marL="274320" marR="0" lvl="0" indent="-274320" algn="l" defTabSz="914400" rtl="0" eaLnBrk="1" fontAlgn="auto" latinLnBrk="0" hangingPunct="1">
+              <a:lnSpc>
+                <a:spcPct val="100000"/>
+              </a:lnSpc>
+              <a:spcBef>
+                <a:spcPts val="580"/>
+              </a:spcBef>
+              <a:spcAft>
+                <a:spcPts val="0"/>
+              </a:spcAft>
+              <a:buClr>
+                <a:schemeClr val="accent1"/>
+              </a:buClr>
+              <a:buSzPct val="85000"/>
+              <a:buFont typeface="Wingdings 2"/>
+              <a:buChar char=""/>
+              <a:tabLst/>
+              <a:defRPr/>
+            </a:pPr>
+            <a:r>
+              <a:rPr kumimoji="0" lang="en-US" sz="2600" b="0" i="0" u="none" strike="noStrike" kern="1200" cap="none" spc="0" normalizeH="0" baseline="0" noProof="0" dirty="0" smtClean="0">
+                <a:ln>
+                  <a:noFill/>
+                </a:ln>
+                <a:solidFill>
+                  <a:schemeClr val="tx1"/>
+                </a:solidFill>
+                <a:effectLst/>
+                <a:uLnTx/>
+                <a:uFillTx/>
+                <a:latin typeface="+mn-lt"/>
+                <a:ea typeface="+mn-ea"/>
+                <a:cs typeface="+mn-cs"/>
+              </a:rPr>
+              <a:t>CUDA Runtime</a:t>
+            </a:r>
+          </a:p>
+        </p:txBody>
+      </p:sp>
+      <p:sp>
+        <p:nvSpPr>
+          <p:cNvPr id="6" name="TextBox 5"/>
+          <p:cNvSpPr txBox="1"/>
+          <p:nvPr/>
+        </p:nvSpPr>
+        <p:spPr>
+          <a:xfrm>
+            <a:off x="962498" y="4315714"/>
+            <a:ext cx="6806119" cy="2308324"/>
+          </a:xfrm>
+          <a:prstGeom prst="rect">
+            <a:avLst/>
+          </a:prstGeom>
+        </p:spPr>
+        <p:style>
+          <a:lnRef idx="2">
+            <a:schemeClr val="accent5"/>
+          </a:lnRef>
+          <a:fillRef idx="1">
+            <a:schemeClr val="lt1"/>
+          </a:fillRef>
+          <a:effectRef idx="0">
+            <a:schemeClr val="accent5"/>
+          </a:effectRef>
+          <a:fontRef idx="minor">
+            <a:schemeClr val="dk1"/>
+          </a:fontRef>
+        </p:style>
+        <p:txBody>
+          <a:bodyPr wrap="square" rtlCol="0">
+            <a:spAutoFit/>
+          </a:bodyPr>
+          <a:lstStyle/>
+          <a:p>
+            <a:r>
+              <a:rPr lang="en-US" dirty="0" smtClean="0">
+                <a:solidFill>
+                  <a:schemeClr val="tx1"/>
+                </a:solidFill>
+                <a:latin typeface="Andale Mono"/>
+                <a:cs typeface="Andale Mono"/>
+              </a:rPr>
+              <a:t>#include “</a:t>
+            </a:r>
+            <a:r>
+              <a:rPr lang="en-US" dirty="0" err="1" smtClean="0">
+                <a:solidFill>
+                  <a:schemeClr val="tx1"/>
+                </a:solidFill>
+                <a:latin typeface="Andale Mono"/>
+                <a:cs typeface="Andale Mono"/>
+              </a:rPr>
+              <a:t>nvc_texture.h</a:t>
+            </a:r>
+            <a:r>
+              <a:rPr lang="en-US" dirty="0" smtClean="0">
+                <a:solidFill>
+                  <a:schemeClr val="tx1"/>
+                </a:solidFill>
+                <a:latin typeface="Andale Mono"/>
+                <a:cs typeface="Andale Mono"/>
+              </a:rPr>
+              <a:t>”</a:t>
+            </a:r>
+          </a:p>
+          <a:p>
+            <a:r>
+              <a:rPr lang="en-US" i="1" dirty="0" smtClean="0">
+                <a:solidFill>
+                  <a:srgbClr val="0000FF"/>
+                </a:solidFill>
+                <a:latin typeface="Andale Mono"/>
+                <a:cs typeface="Andale Mono"/>
+              </a:rPr>
+              <a:t>// Texture must be defined within same file</a:t>
+            </a:r>
+          </a:p>
+          <a:p>
+            <a:r>
+              <a:rPr lang="en-US" dirty="0" smtClean="0">
+                <a:solidFill>
+                  <a:schemeClr val="tx1"/>
+                </a:solidFill>
+                <a:latin typeface="Andale Mono"/>
+                <a:cs typeface="Andale Mono"/>
+              </a:rPr>
+              <a:t>texture&lt;float2&gt; </a:t>
+            </a:r>
+            <a:r>
+              <a:rPr lang="en-US" dirty="0" err="1" smtClean="0">
+                <a:solidFill>
+                  <a:schemeClr val="tx1"/>
+                </a:solidFill>
+                <a:latin typeface="Andale Mono"/>
+                <a:cs typeface="Andale Mono"/>
+              </a:rPr>
+              <a:t>tex</a:t>
+            </a:r>
+            <a:r>
+              <a:rPr lang="en-US" dirty="0" smtClean="0">
+                <a:solidFill>
+                  <a:schemeClr val="tx1"/>
+                </a:solidFill>
+                <a:latin typeface="Andale Mono"/>
+                <a:cs typeface="Andale Mono"/>
+              </a:rPr>
+              <a:t>;</a:t>
+            </a:r>
+          </a:p>
+          <a:p>
+            <a:r>
+              <a:rPr lang="en-US" dirty="0" smtClean="0">
+                <a:solidFill>
+                  <a:schemeClr val="tx1"/>
+                </a:solidFill>
+                <a:latin typeface="Andale Mono"/>
+                <a:cs typeface="Andale Mono"/>
+              </a:rPr>
+              <a:t> </a:t>
+            </a:r>
+          </a:p>
+          <a:p>
+            <a:r>
+              <a:rPr lang="en-US" dirty="0" err="1" smtClean="0">
+                <a:solidFill>
+                  <a:schemeClr val="tx1"/>
+                </a:solidFill>
+                <a:latin typeface="Andale Mono"/>
+                <a:cs typeface="Andale Mono"/>
+              </a:rPr>
+              <a:t>UCL_Texture</a:t>
+            </a:r>
+            <a:r>
+              <a:rPr lang="en-US" dirty="0" smtClean="0">
+                <a:solidFill>
+                  <a:schemeClr val="tx1"/>
+                </a:solidFill>
+                <a:latin typeface="Andale Mono"/>
+                <a:cs typeface="Andale Mono"/>
+              </a:rPr>
+              <a:t> </a:t>
+            </a:r>
+            <a:r>
+              <a:rPr lang="en-US" dirty="0" err="1" smtClean="0">
+                <a:solidFill>
+                  <a:schemeClr val="tx1"/>
+                </a:solidFill>
+                <a:latin typeface="Andale Mono"/>
+                <a:cs typeface="Andale Mono"/>
+              </a:rPr>
+              <a:t>my_tex(tex</a:t>
+            </a:r>
+            <a:r>
+              <a:rPr lang="en-US" dirty="0" smtClean="0">
+                <a:solidFill>
+                  <a:schemeClr val="tx1"/>
+                </a:solidFill>
+                <a:latin typeface="Andale Mono"/>
+                <a:cs typeface="Andale Mono"/>
+              </a:rPr>
+              <a:t>);</a:t>
+            </a:r>
+          </a:p>
+          <a:p>
+            <a:r>
+              <a:rPr lang="en-US" i="1" dirty="0" smtClean="0">
+                <a:solidFill>
+                  <a:srgbClr val="0000FF"/>
+                </a:solidFill>
+                <a:latin typeface="Andale Mono"/>
+                <a:cs typeface="Andale Mono"/>
+              </a:rPr>
+              <a:t>// -- or –</a:t>
+            </a:r>
+            <a:endParaRPr lang="en-US" dirty="0" smtClean="0">
+              <a:solidFill>
+                <a:schemeClr val="tx1"/>
+              </a:solidFill>
+              <a:latin typeface="Andale Mono"/>
+              <a:cs typeface="Andale Mono"/>
+            </a:endParaRPr>
+          </a:p>
+          <a:p>
+            <a:r>
+              <a:rPr lang="en-US" dirty="0" err="1" smtClean="0">
+                <a:solidFill>
+                  <a:schemeClr val="tx1"/>
+                </a:solidFill>
+                <a:latin typeface="Andale Mono"/>
+                <a:cs typeface="Andale Mono"/>
+              </a:rPr>
+              <a:t>UCL_Texture</a:t>
+            </a:r>
+            <a:r>
+              <a:rPr lang="en-US" dirty="0" smtClean="0">
+                <a:solidFill>
+                  <a:schemeClr val="tx1"/>
+                </a:solidFill>
+                <a:latin typeface="Andale Mono"/>
+                <a:cs typeface="Andale Mono"/>
+              </a:rPr>
+              <a:t> </a:t>
+            </a:r>
+            <a:r>
+              <a:rPr lang="en-US" dirty="0" err="1" smtClean="0">
+                <a:solidFill>
+                  <a:schemeClr val="tx1"/>
+                </a:solidFill>
+                <a:latin typeface="Andale Mono"/>
+                <a:cs typeface="Andale Mono"/>
+              </a:rPr>
+              <a:t>my_tex</a:t>
+            </a:r>
+            <a:r>
+              <a:rPr lang="en-US" dirty="0" smtClean="0">
+                <a:solidFill>
+                  <a:schemeClr val="tx1"/>
+                </a:solidFill>
+                <a:latin typeface="Andale Mono"/>
+                <a:cs typeface="Andale Mono"/>
+              </a:rPr>
+              <a:t>;</a:t>
+            </a:r>
+          </a:p>
+          <a:p>
+            <a:r>
+              <a:rPr lang="en-US" dirty="0" err="1" smtClean="0">
+                <a:solidFill>
+                  <a:schemeClr val="tx1"/>
+                </a:solidFill>
+                <a:latin typeface="Andale Mono"/>
+                <a:cs typeface="Andale Mono"/>
+              </a:rPr>
+              <a:t>my_tex.get_texture(tex</a:t>
+            </a:r>
+            <a:r>
+              <a:rPr lang="en-US" dirty="0" smtClean="0">
+                <a:solidFill>
+                  <a:schemeClr val="tx1"/>
+                </a:solidFill>
+                <a:latin typeface="Andale Mono"/>
+                <a:cs typeface="Andale Mono"/>
+              </a:rPr>
+              <a:t>);</a:t>
+            </a:r>
+          </a:p>
+        </p:txBody>
+      </p:sp>
+    </p:spTree>
+  </p:cSld>
+  <p:clrMapOvr>
+    <a:masterClrMapping/>
+  </p:clrMapOvr>
+</p:sld>
+</file>
+
+<file path=ppt/slides/slide66.xml><?xml version="1.0" encoding="utf-8"?>
+<p:sld xmlns:a="http://schemas.openxmlformats.org/drawingml/2006/main" xmlns:r="http://schemas.openxmlformats.org/officeDocument/2006/relationships" xmlns:p="http://schemas.openxmlformats.org/presentationml/2006/main">
+  <p:cSld>
+    <p:spTree>
+      <p:nvGrpSpPr>
+        <p:cNvPr id="1" name=""/>
+        <p:cNvGrpSpPr/>
+        <p:nvPr/>
+      </p:nvGrpSpPr>
+      <p:grpSpPr>
+        <a:xfrm>
+          <a:off x="0" y="0"/>
+          <a:ext cx="0" cy="0"/>
+          <a:chOff x="0" y="0"/>
+          <a:chExt cx="0" cy="0"/>
+        </a:xfrm>
+      </p:grpSpPr>
+      <p:sp>
+        <p:nvSpPr>
+          <p:cNvPr id="2" name="Title 1"/>
+          <p:cNvSpPr>
+            <a:spLocks noGrp="1"/>
+          </p:cNvSpPr>
+          <p:nvPr>
+            <p:ph type="title"/>
+          </p:nvPr>
+        </p:nvSpPr>
         <p:spPr/>
         <p:txBody>
           <a:bodyPr/>
@@ -22514,7 +22737,7 @@
 </p:sld>
 </file>
 
-<file path=ppt/slides/slide66.xml><?xml version="1.0" encoding="utf-8"?>
+<file path=ppt/slides/slide67.xml><?xml version="1.0" encoding="utf-8"?>
 <p:sld xmlns:a="http://schemas.openxmlformats.org/drawingml/2006/main" xmlns:r="http://schemas.openxmlformats.org/officeDocument/2006/relationships" xmlns:p="http://schemas.openxmlformats.org/presentationml/2006/main">
   <p:cSld>
     <p:spTree>
@@ -22592,7 +22815,7 @@
 </p:sld>
 </file>
 
-<file path=ppt/slides/slide67.xml><?xml version="1.0" encoding="utf-8"?>
+<file path=ppt/slides/slide68.xml><?xml version="1.0" encoding="utf-8"?>
 <p:sld xmlns:a="http://schemas.openxmlformats.org/drawingml/2006/main" xmlns:r="http://schemas.openxmlformats.org/officeDocument/2006/relationships" xmlns:p="http://schemas.openxmlformats.org/presentationml/2006/main">
   <p:cSld>
     <p:spTree>

</xml_diff>